<commit_message>
Added link to presentation material to PPT
</commit_message>
<xml_diff>
--- a/BallroomA_Wednesday_1100_Lichtenberg/BallroomA_Wednesday_1100_Lichtenberg.pptx
+++ b/BallroomA_Wednesday_1100_Lichtenberg/BallroomA_Wednesday_1100_Lichtenberg.pptx
@@ -134,7 +134,7 @@
   </p:defaultTextStyle>
   <p:extLst>
     <p:ext uri="{EFAFB233-063F-42B5-8137-9DF3F51BA10A}">
-      <p15:sldGuideLst xmlns:p15="http://schemas.microsoft.com/office/powerpoint/2012/main" xmlns="">
+      <p15:sldGuideLst xmlns="" xmlns:p15="http://schemas.microsoft.com/office/powerpoint/2012/main">
         <p15:guide id="1" orient="horz" pos="2160">
           <p15:clr>
             <a:srgbClr val="A4A3A4"/>
@@ -234,7 +234,7 @@
             <a:fld id="{A4076B97-77BE-4089-B3C3-FDBC79649A58}" type="datetimeFigureOut">
               <a:rPr lang="en-US" smtClean="0"/>
               <a:pPr/>
-              <a:t>9/29/2017</a:t>
+              <a:t>10/1/2017</a:t>
             </a:fld>
             <a:endParaRPr lang="en-US"/>
           </a:p>
@@ -310,7 +310,7 @@
     </p:spTree>
     <p:extLst>
       <p:ext uri="{BB962C8B-B14F-4D97-AF65-F5344CB8AC3E}">
-        <p14:creationId xmlns:p14="http://schemas.microsoft.com/office/powerpoint/2010/main" val="1542679036"/>
+        <p14:creationId xmlns:p14="http://schemas.microsoft.com/office/powerpoint/2010/main" xmlns="" val="1542679036"/>
       </p:ext>
     </p:extLst>
   </p:cSld>
@@ -401,7 +401,7 @@
             <a:fld id="{0F20EE3F-066A-464D-B097-D1A3B5F04D50}" type="datetimeFigureOut">
               <a:rPr lang="en-US" smtClean="0"/>
               <a:pPr/>
-              <a:t>9/29/2017</a:t>
+              <a:t>10/1/2017</a:t>
             </a:fld>
             <a:endParaRPr lang="en-US"/>
           </a:p>
@@ -570,7 +570,7 @@
     </p:spTree>
     <p:extLst>
       <p:ext uri="{BB962C8B-B14F-4D97-AF65-F5344CB8AC3E}">
-        <p14:creationId xmlns:p14="http://schemas.microsoft.com/office/powerpoint/2010/main" val="1465351002"/>
+        <p14:creationId xmlns:p14="http://schemas.microsoft.com/office/powerpoint/2010/main" xmlns="" val="1465351002"/>
       </p:ext>
     </p:extLst>
   </p:cSld>
@@ -769,7 +769,7 @@
     </p:spTree>
     <p:extLst>
       <p:ext uri="{BB962C8B-B14F-4D97-AF65-F5344CB8AC3E}">
-        <p14:creationId xmlns:p14="http://schemas.microsoft.com/office/powerpoint/2010/main" val="4098884712"/>
+        <p14:creationId xmlns:p14="http://schemas.microsoft.com/office/powerpoint/2010/main" xmlns="" val="4098884712"/>
       </p:ext>
     </p:extLst>
   </p:cSld>
@@ -862,8 +862,42 @@
                 <a:ea typeface="+mn-ea"/>
                 <a:cs typeface="+mn-cs"/>
               </a:rPr>
-              <a:t>metadata from an archive. </a:t>
-            </a:r>
+              <a:t>metadata from an archive. It is supported by </a:t>
+            </a:r>
+            <a:r>
+              <a:rPr lang="en-US" sz="1200" b="0" kern="1200" baseline="0" dirty="0" smtClean="0">
+                <a:solidFill>
+                  <a:schemeClr val="tx1"/>
+                </a:solidFill>
+                <a:effectLst/>
+                <a:latin typeface="+mn-lt"/>
+                <a:ea typeface="+mn-ea"/>
+                <a:cs typeface="+mn-cs"/>
+              </a:rPr>
+              <a:t>many repositories and software systems.</a:t>
+            </a:r>
+            <a:endParaRPr lang="en-US" sz="1200" b="0" kern="1200" dirty="0" smtClean="0">
+              <a:solidFill>
+                <a:schemeClr val="tx1"/>
+              </a:solidFill>
+              <a:effectLst/>
+              <a:latin typeface="+mn-lt"/>
+              <a:ea typeface="+mn-ea"/>
+              <a:cs typeface="+mn-cs"/>
+            </a:endParaRPr>
+          </a:p>
+          <a:p>
+            <a:endParaRPr lang="en-US" sz="1200" b="0" kern="1200" dirty="0" smtClean="0">
+              <a:solidFill>
+                <a:schemeClr val="tx1"/>
+              </a:solidFill>
+              <a:effectLst/>
+              <a:latin typeface="+mn-lt"/>
+              <a:ea typeface="+mn-ea"/>
+              <a:cs typeface="+mn-cs"/>
+            </a:endParaRPr>
+          </a:p>
+          <a:p>
             <a:r>
               <a:rPr lang="en-US" sz="1200" b="0" kern="1200" dirty="0" smtClean="0">
                 <a:solidFill>
@@ -874,44 +908,10 @@
                 <a:ea typeface="+mn-ea"/>
                 <a:cs typeface="+mn-cs"/>
               </a:rPr>
-              <a:t>It is supported by </a:t>
-            </a:r>
-            <a:r>
-              <a:rPr lang="en-US" sz="1200" b="0" kern="1200" baseline="0" dirty="0" smtClean="0">
-                <a:solidFill>
-                  <a:schemeClr val="tx1"/>
-                </a:solidFill>
-                <a:effectLst/>
-                <a:latin typeface="+mn-lt"/>
-                <a:ea typeface="+mn-ea"/>
-                <a:cs typeface="+mn-cs"/>
-              </a:rPr>
-              <a:t>many </a:t>
-            </a:r>
-            <a:r>
-              <a:rPr lang="en-US" sz="1200" b="0" kern="1200" baseline="0" dirty="0" smtClean="0">
-                <a:solidFill>
-                  <a:schemeClr val="tx1"/>
-                </a:solidFill>
-                <a:effectLst/>
-                <a:latin typeface="+mn-lt"/>
-                <a:ea typeface="+mn-ea"/>
-                <a:cs typeface="+mn-cs"/>
-              </a:rPr>
-              <a:t>repositories and software </a:t>
-            </a:r>
-            <a:r>
-              <a:rPr lang="en-US" sz="1200" b="0" kern="1200" baseline="0" dirty="0" smtClean="0">
-                <a:solidFill>
-                  <a:schemeClr val="tx1"/>
-                </a:solidFill>
-                <a:effectLst/>
-                <a:latin typeface="+mn-lt"/>
-                <a:ea typeface="+mn-ea"/>
-                <a:cs typeface="+mn-cs"/>
-              </a:rPr>
-              <a:t>systems.</a:t>
-            </a:r>
+              <a:t>BHL is an OAI publisher.</a:t>
+            </a:r>
+          </a:p>
+          <a:p>
             <a:endParaRPr lang="en-US" sz="1200" b="0" kern="1200" dirty="0" smtClean="0">
               <a:solidFill>
                 <a:schemeClr val="tx1"/>
@@ -923,17 +923,6 @@
             </a:endParaRPr>
           </a:p>
           <a:p>
-            <a:endParaRPr lang="en-US" sz="1200" b="0" kern="1200" dirty="0" smtClean="0">
-              <a:solidFill>
-                <a:schemeClr val="tx1"/>
-              </a:solidFill>
-              <a:effectLst/>
-              <a:latin typeface="+mn-lt"/>
-              <a:ea typeface="+mn-ea"/>
-              <a:cs typeface="+mn-cs"/>
-            </a:endParaRPr>
-          </a:p>
-          <a:p>
             <a:r>
               <a:rPr lang="en-US" sz="1200" b="0" kern="1200" dirty="0" smtClean="0">
                 <a:solidFill>
@@ -944,68 +933,7 @@
                 <a:ea typeface="+mn-ea"/>
                 <a:cs typeface="+mn-cs"/>
               </a:rPr>
-              <a:t>BHL is an </a:t>
-            </a:r>
-            <a:r>
-              <a:rPr lang="en-US" sz="1200" b="0" kern="1200" dirty="0" smtClean="0">
-                <a:solidFill>
-                  <a:schemeClr val="tx1"/>
-                </a:solidFill>
-                <a:effectLst/>
-                <a:latin typeface="+mn-lt"/>
-                <a:ea typeface="+mn-ea"/>
-                <a:cs typeface="+mn-cs"/>
-              </a:rPr>
-              <a:t>OAI </a:t>
-            </a:r>
-            <a:r>
-              <a:rPr lang="en-US" sz="1200" b="0" kern="1200" dirty="0" smtClean="0">
-                <a:solidFill>
-                  <a:schemeClr val="tx1"/>
-                </a:solidFill>
-                <a:effectLst/>
-                <a:latin typeface="+mn-lt"/>
-                <a:ea typeface="+mn-ea"/>
-                <a:cs typeface="+mn-cs"/>
-              </a:rPr>
-              <a:t>publisher.</a:t>
-            </a:r>
-          </a:p>
-          <a:p>
-            <a:endParaRPr lang="en-US" sz="1200" b="0" kern="1200" dirty="0" smtClean="0">
-              <a:solidFill>
-                <a:schemeClr val="tx1"/>
-              </a:solidFill>
-              <a:effectLst/>
-              <a:latin typeface="+mn-lt"/>
-              <a:ea typeface="+mn-ea"/>
-              <a:cs typeface="+mn-cs"/>
-            </a:endParaRPr>
-          </a:p>
-          <a:p>
-            <a:r>
-              <a:rPr lang="en-US" sz="1200" b="0" kern="1200" dirty="0" smtClean="0">
-                <a:solidFill>
-                  <a:schemeClr val="tx1"/>
-                </a:solidFill>
-                <a:effectLst/>
-                <a:latin typeface="+mn-lt"/>
-                <a:ea typeface="+mn-ea"/>
-                <a:cs typeface="+mn-cs"/>
-              </a:rPr>
-              <a:t>OAI </a:t>
-            </a:r>
-            <a:r>
-              <a:rPr lang="en-US" sz="1200" b="0" kern="1200" dirty="0" smtClean="0">
-                <a:solidFill>
-                  <a:schemeClr val="tx1"/>
-                </a:solidFill>
-                <a:effectLst/>
-                <a:latin typeface="+mn-lt"/>
-                <a:ea typeface="+mn-ea"/>
-                <a:cs typeface="+mn-cs"/>
-              </a:rPr>
-              <a:t>requests are</a:t>
+              <a:t>OAI requests are</a:t>
             </a:r>
             <a:r>
               <a:rPr lang="en-US" sz="1200" b="0" kern="1200" baseline="0" dirty="0" smtClean="0">
@@ -1029,31 +957,7 @@
                 <a:ea typeface="+mn-ea"/>
                 <a:cs typeface="+mn-cs"/>
               </a:rPr>
-              <a:t>sent </a:t>
-            </a:r>
-            <a:r>
-              <a:rPr lang="en-US" sz="1200" b="0" kern="1200" dirty="0" smtClean="0">
-                <a:solidFill>
-                  <a:schemeClr val="tx1"/>
-                </a:solidFill>
-                <a:effectLst/>
-                <a:latin typeface="+mn-lt"/>
-                <a:ea typeface="+mn-ea"/>
-                <a:cs typeface="+mn-cs"/>
-              </a:rPr>
-              <a:t>via HTTP GET requests</a:t>
-            </a:r>
-            <a:r>
-              <a:rPr lang="en-US" sz="1200" b="0" kern="1200" dirty="0" smtClean="0">
-                <a:solidFill>
-                  <a:schemeClr val="tx1"/>
-                </a:solidFill>
-                <a:effectLst/>
-                <a:latin typeface="+mn-lt"/>
-                <a:ea typeface="+mn-ea"/>
-                <a:cs typeface="+mn-cs"/>
-              </a:rPr>
-              <a:t>, and responses</a:t>
+              <a:t>sent via HTTP GET requests, and responses</a:t>
             </a:r>
             <a:r>
               <a:rPr lang="en-US" sz="1200" b="0" kern="1200" baseline="0" dirty="0" smtClean="0">
@@ -1065,8 +969,21 @@
                 <a:ea typeface="+mn-ea"/>
                 <a:cs typeface="+mn-cs"/>
               </a:rPr>
-              <a:t> are </a:t>
-            </a:r>
+              <a:t> are returned as XML.</a:t>
+            </a:r>
+          </a:p>
+          <a:p>
+            <a:endParaRPr lang="en-US" sz="1200" b="0" kern="1200" baseline="0" dirty="0" smtClean="0">
+              <a:solidFill>
+                <a:schemeClr val="tx1"/>
+              </a:solidFill>
+              <a:effectLst/>
+              <a:latin typeface="+mn-lt"/>
+              <a:ea typeface="+mn-ea"/>
+              <a:cs typeface="+mn-cs"/>
+            </a:endParaRPr>
+          </a:p>
+          <a:p>
             <a:r>
               <a:rPr lang="en-US" sz="1200" b="0" kern="1200" baseline="0" dirty="0" smtClean="0">
                 <a:solidFill>
@@ -1077,8 +994,21 @@
                 <a:ea typeface="+mn-ea"/>
                 <a:cs typeface="+mn-cs"/>
               </a:rPr>
-              <a:t>returned as XML</a:t>
-            </a:r>
+              <a:t>There are six verbs (or commands) recognized by an OAI publishing server.  Three return information about the publisher and data available, and three return the published data.  </a:t>
+            </a:r>
+          </a:p>
+          <a:p>
+            <a:endParaRPr lang="en-US" sz="1200" b="0" kern="1200" baseline="0" dirty="0" smtClean="0">
+              <a:solidFill>
+                <a:schemeClr val="tx1"/>
+              </a:solidFill>
+              <a:effectLst/>
+              <a:latin typeface="+mn-lt"/>
+              <a:ea typeface="+mn-ea"/>
+              <a:cs typeface="+mn-cs"/>
+            </a:endParaRPr>
+          </a:p>
+          <a:p>
             <a:r>
               <a:rPr lang="en-US" sz="1200" b="0" kern="1200" baseline="0" dirty="0" smtClean="0">
                 <a:solidFill>
@@ -1089,151 +1019,8 @@
                 <a:ea typeface="+mn-ea"/>
                 <a:cs typeface="+mn-cs"/>
               </a:rPr>
-              <a:t>.</a:t>
-            </a:r>
-          </a:p>
-          <a:p>
-            <a:endParaRPr lang="en-US" sz="1200" b="0" kern="1200" baseline="0" dirty="0" smtClean="0">
-              <a:solidFill>
-                <a:schemeClr val="tx1"/>
-              </a:solidFill>
-              <a:effectLst/>
-              <a:latin typeface="+mn-lt"/>
-              <a:ea typeface="+mn-ea"/>
-              <a:cs typeface="+mn-cs"/>
-            </a:endParaRPr>
-          </a:p>
-          <a:p>
-            <a:r>
-              <a:rPr lang="en-US" sz="1200" b="0" kern="1200" baseline="0" dirty="0" smtClean="0">
-                <a:solidFill>
-                  <a:schemeClr val="tx1"/>
-                </a:solidFill>
-                <a:effectLst/>
-                <a:latin typeface="+mn-lt"/>
-                <a:ea typeface="+mn-ea"/>
-                <a:cs typeface="+mn-cs"/>
-              </a:rPr>
-              <a:t>There are six verbs (or commands) recognized by an </a:t>
-            </a:r>
-            <a:r>
-              <a:rPr lang="en-US" sz="1200" b="0" kern="1200" baseline="0" dirty="0" smtClean="0">
-                <a:solidFill>
-                  <a:schemeClr val="tx1"/>
-                </a:solidFill>
-                <a:effectLst/>
-                <a:latin typeface="+mn-lt"/>
-                <a:ea typeface="+mn-ea"/>
-                <a:cs typeface="+mn-cs"/>
-              </a:rPr>
-              <a:t>OAI publishing </a:t>
-            </a:r>
-            <a:r>
-              <a:rPr lang="en-US" sz="1200" b="0" kern="1200" baseline="0" dirty="0" smtClean="0">
-                <a:solidFill>
-                  <a:schemeClr val="tx1"/>
-                </a:solidFill>
-                <a:effectLst/>
-                <a:latin typeface="+mn-lt"/>
-                <a:ea typeface="+mn-ea"/>
-                <a:cs typeface="+mn-cs"/>
-              </a:rPr>
-              <a:t>server</a:t>
-            </a:r>
-            <a:r>
-              <a:rPr lang="en-US" sz="1200" b="0" kern="1200" baseline="0" dirty="0" smtClean="0">
-                <a:solidFill>
-                  <a:schemeClr val="tx1"/>
-                </a:solidFill>
-                <a:effectLst/>
-                <a:latin typeface="+mn-lt"/>
-                <a:ea typeface="+mn-ea"/>
-                <a:cs typeface="+mn-cs"/>
-              </a:rPr>
-              <a:t>.  Three return information about the publisher and data available, and three return the published data.  </a:t>
-            </a:r>
-          </a:p>
-          <a:p>
-            <a:endParaRPr lang="en-US" sz="1200" b="0" kern="1200" baseline="0" dirty="0" smtClean="0">
-              <a:solidFill>
-                <a:schemeClr val="tx1"/>
-              </a:solidFill>
-              <a:effectLst/>
-              <a:latin typeface="+mn-lt"/>
-              <a:ea typeface="+mn-ea"/>
-              <a:cs typeface="+mn-cs"/>
-            </a:endParaRPr>
-          </a:p>
-          <a:p>
-            <a:r>
-              <a:rPr lang="en-US" sz="1200" b="0" kern="1200" baseline="0" dirty="0" smtClean="0">
-                <a:solidFill>
-                  <a:schemeClr val="tx1"/>
-                </a:solidFill>
-                <a:effectLst/>
-                <a:latin typeface="+mn-lt"/>
-                <a:ea typeface="+mn-ea"/>
-                <a:cs typeface="+mn-cs"/>
-              </a:rPr>
-              <a:t>The </a:t>
-            </a:r>
-            <a:r>
-              <a:rPr lang="en-US" sz="1200" b="0" kern="1200" baseline="0" dirty="0" smtClean="0">
-                <a:solidFill>
-                  <a:schemeClr val="tx1"/>
-                </a:solidFill>
-                <a:effectLst/>
-                <a:latin typeface="+mn-lt"/>
-                <a:ea typeface="+mn-ea"/>
-                <a:cs typeface="+mn-cs"/>
-              </a:rPr>
-              <a:t>OAI protocol supports requests for individual records or for only data that is new or has </a:t>
-            </a:r>
-            <a:r>
-              <a:rPr lang="en-US" sz="1200" b="0" kern="1200" baseline="0" dirty="0" smtClean="0">
-                <a:solidFill>
-                  <a:schemeClr val="tx1"/>
-                </a:solidFill>
-                <a:effectLst/>
-                <a:latin typeface="+mn-lt"/>
-                <a:ea typeface="+mn-ea"/>
-                <a:cs typeface="+mn-cs"/>
-              </a:rPr>
-              <a:t>changed, </a:t>
-            </a:r>
-            <a:r>
-              <a:rPr lang="en-US" sz="1200" b="0" kern="1200" baseline="0" dirty="0" smtClean="0">
-                <a:solidFill>
-                  <a:schemeClr val="tx1"/>
-                </a:solidFill>
-                <a:effectLst/>
-                <a:latin typeface="+mn-lt"/>
-                <a:ea typeface="+mn-ea"/>
-                <a:cs typeface="+mn-cs"/>
-              </a:rPr>
-              <a:t>so data can be harvested incrementally</a:t>
-            </a:r>
-            <a:r>
-              <a:rPr lang="en-US" sz="1200" b="0" kern="1200" baseline="0" dirty="0" smtClean="0">
-                <a:solidFill>
-                  <a:schemeClr val="tx1"/>
-                </a:solidFill>
-                <a:effectLst/>
-                <a:latin typeface="+mn-lt"/>
-                <a:ea typeface="+mn-ea"/>
-                <a:cs typeface="+mn-cs"/>
-              </a:rPr>
-              <a:t>.  Other BHL data access methods do not allow for incremental harvesting.</a:t>
-            </a:r>
-            <a:endParaRPr lang="en-US" sz="1200" b="0" kern="1200" baseline="0" dirty="0" smtClean="0">
-              <a:solidFill>
-                <a:schemeClr val="tx1"/>
-              </a:solidFill>
-              <a:effectLst/>
-              <a:latin typeface="+mn-lt"/>
-              <a:ea typeface="+mn-ea"/>
-              <a:cs typeface="+mn-cs"/>
-            </a:endParaRPr>
+              <a:t>The OAI protocol supports requests for individual records or for only data that is new or has changed, so data can be harvested incrementally.  Other BHL data access methods do not allow for incremental harvesting.</a:t>
+            </a:r>
           </a:p>
           <a:p>
             <a:endParaRPr lang="en-US" sz="1200" b="0" kern="1200" baseline="0" dirty="0" smtClean="0">
@@ -1300,7 +1087,7 @@
     </p:spTree>
     <p:extLst>
       <p:ext uri="{BB962C8B-B14F-4D97-AF65-F5344CB8AC3E}">
-        <p14:creationId xmlns:p14="http://schemas.microsoft.com/office/powerpoint/2010/main" val="1056626509"/>
+        <p14:creationId xmlns:p14="http://schemas.microsoft.com/office/powerpoint/2010/main" xmlns="" val="1056626509"/>
       </p:ext>
     </p:extLst>
   </p:cSld>
@@ -1365,19 +1152,7 @@
             </a:r>
             <a:r>
               <a:rPr lang="en-US" baseline="0" dirty="0" smtClean="0"/>
-              <a:t> by BHL’s </a:t>
-            </a:r>
-            <a:r>
-              <a:rPr lang="en-US" baseline="0" dirty="0" smtClean="0"/>
-              <a:t>OAI </a:t>
-            </a:r>
-            <a:r>
-              <a:rPr lang="en-US" baseline="0" dirty="0" smtClean="0"/>
-              <a:t>publishing service are Dublin Core, MODS, and OLEF</a:t>
-            </a:r>
-            <a:r>
-              <a:rPr lang="en-US" baseline="0" dirty="0" smtClean="0"/>
-              <a:t>.</a:t>
+              <a:t> by BHL’s OAI publishing service are Dublin Core, MODS, and OLEF.</a:t>
             </a:r>
             <a:endParaRPr lang="en-US" dirty="0" smtClean="0"/>
           </a:p>
@@ -1395,11 +1170,7 @@
             </a:r>
             <a:r>
               <a:rPr lang="en-US" dirty="0" smtClean="0"/>
-              <a:t>o support for page-level </a:t>
-            </a:r>
-            <a:r>
-              <a:rPr lang="en-US" dirty="0" smtClean="0"/>
-              <a:t>information</a:t>
+              <a:t>o support for page-level information</a:t>
             </a:r>
             <a:r>
               <a:rPr lang="en-US" baseline="0" dirty="0" smtClean="0"/>
@@ -1409,7 +1180,6 @@
               <a:rPr lang="en-US" dirty="0" smtClean="0"/>
               <a:t>names and text).  </a:t>
             </a:r>
-            <a:endParaRPr lang="en-US" dirty="0" smtClean="0"/>
           </a:p>
           <a:p>
             <a:r>
@@ -1418,25 +1188,12 @@
             </a:r>
             <a:r>
               <a:rPr lang="en-US" baseline="0" dirty="0" smtClean="0"/>
-              <a:t> </a:t>
-            </a:r>
-            <a:r>
-              <a:rPr lang="en-US" baseline="0" dirty="0" smtClean="0"/>
-              <a:t>and again has </a:t>
-            </a:r>
-            <a:r>
-              <a:rPr lang="en-US" baseline="0" dirty="0" smtClean="0"/>
-              <a:t>n</a:t>
+              <a:t> and again has n</a:t>
             </a:r>
             <a:r>
               <a:rPr lang="en-US" dirty="0" smtClean="0"/>
-              <a:t>o support for page-level </a:t>
-            </a:r>
-            <a:r>
-              <a:rPr lang="en-US" dirty="0" smtClean="0"/>
-              <a:t>information.</a:t>
-            </a:r>
-            <a:endParaRPr lang="en-US" dirty="0" smtClean="0"/>
+              <a:t>o support for page-level information.</a:t>
+            </a:r>
           </a:p>
           <a:p>
             <a:endParaRPr lang="en-US" dirty="0" smtClean="0"/>
@@ -1452,23 +1209,11 @@
             </a:r>
             <a:r>
               <a:rPr lang="en-US" dirty="0" smtClean="0"/>
-              <a:t>it </a:t>
-            </a:r>
-            <a:r>
-              <a:rPr lang="en-US" dirty="0" smtClean="0"/>
-              <a:t>does support </a:t>
-            </a:r>
-            <a:r>
-              <a:rPr lang="en-US" dirty="0" smtClean="0"/>
-              <a:t>page-level metadata, including names</a:t>
+              <a:t>it does support page-level metadata, including names</a:t>
             </a:r>
             <a:r>
               <a:rPr lang="en-US" baseline="0" dirty="0" smtClean="0"/>
-              <a:t> and links to page </a:t>
-            </a:r>
-            <a:r>
-              <a:rPr lang="en-US" baseline="0" dirty="0" smtClean="0"/>
-              <a:t>scans.  Still no text, though.</a:t>
+              <a:t> and links to page scans.  Still no text, though.</a:t>
             </a:r>
             <a:endParaRPr lang="en-US" dirty="0" smtClean="0"/>
           </a:p>
@@ -1538,7 +1283,7 @@
     </p:spTree>
     <p:extLst>
       <p:ext uri="{BB962C8B-B14F-4D97-AF65-F5344CB8AC3E}">
-        <p14:creationId xmlns:p14="http://schemas.microsoft.com/office/powerpoint/2010/main" val="186999312"/>
+        <p14:creationId xmlns:p14="http://schemas.microsoft.com/office/powerpoint/2010/main" xmlns="" val="186999312"/>
       </p:ext>
     </p:extLst>
   </p:cSld>
@@ -1620,15 +1365,7 @@
           <a:p>
             <a:r>
               <a:rPr lang="en-US" baseline="0" dirty="0" smtClean="0"/>
-              <a:t>Within OLEF, show page-level metadata, including page types, </a:t>
-            </a:r>
-            <a:r>
-              <a:rPr lang="en-US" baseline="0" dirty="0" smtClean="0"/>
-              <a:t>pagination data, </a:t>
-            </a:r>
-            <a:r>
-              <a:rPr lang="en-US" baseline="0" dirty="0" smtClean="0"/>
-              <a:t>names, and image links.</a:t>
+              <a:t>Within OLEF, show page-level metadata, including page types, pagination data, names, and image links.</a:t>
             </a:r>
             <a:endParaRPr lang="en-US" dirty="0"/>
           </a:p>
@@ -1661,7 +1398,7 @@
     </p:spTree>
     <p:extLst>
       <p:ext uri="{BB962C8B-B14F-4D97-AF65-F5344CB8AC3E}">
-        <p14:creationId xmlns:p14="http://schemas.microsoft.com/office/powerpoint/2010/main" val="1984052621"/>
+        <p14:creationId xmlns:p14="http://schemas.microsoft.com/office/powerpoint/2010/main" xmlns="" val="1984052621"/>
       </p:ext>
     </p:extLst>
   </p:cSld>
@@ -1829,31 +1566,7 @@
                 <a:ea typeface="+mn-ea"/>
                 <a:cs typeface="+mn-cs"/>
               </a:rPr>
-              <a:t> </a:t>
-            </a:r>
-            <a:r>
-              <a:rPr lang="en-US" sz="1200" b="0" kern="1200" baseline="0" dirty="0" smtClean="0">
-                <a:solidFill>
-                  <a:schemeClr val="tx1"/>
-                </a:solidFill>
-                <a:effectLst/>
-                <a:latin typeface="+mn-lt"/>
-                <a:ea typeface="+mn-ea"/>
-                <a:cs typeface="+mn-cs"/>
-              </a:rPr>
-              <a:t>APIs available </a:t>
-            </a:r>
-            <a:r>
-              <a:rPr lang="en-US" sz="1200" b="0" kern="1200" baseline="0" dirty="0" smtClean="0">
-                <a:solidFill>
-                  <a:schemeClr val="tx1"/>
-                </a:solidFill>
-                <a:effectLst/>
-                <a:latin typeface="+mn-lt"/>
-                <a:ea typeface="+mn-ea"/>
-                <a:cs typeface="+mn-cs"/>
-              </a:rPr>
-              <a:t>that allow many different types of requests for BHL data.  Searches can be performed, metadata can be retrieved, and page text is available.</a:t>
+              <a:t> APIs available that allow many different types of requests for BHL data.  Searches can be performed, metadata can be retrieved, and page text is available.</a:t>
             </a:r>
           </a:p>
           <a:p>
@@ -1979,7 +1692,7 @@
     </p:spTree>
     <p:extLst>
       <p:ext uri="{BB962C8B-B14F-4D97-AF65-F5344CB8AC3E}">
-        <p14:creationId xmlns:p14="http://schemas.microsoft.com/office/powerpoint/2010/main" val="2255951382"/>
+        <p14:creationId xmlns:p14="http://schemas.microsoft.com/office/powerpoint/2010/main" xmlns="" val="2255951382"/>
       </p:ext>
     </p:extLst>
   </p:cSld>
@@ -2087,7 +1800,7 @@
     </p:spTree>
     <p:extLst>
       <p:ext uri="{BB962C8B-B14F-4D97-AF65-F5344CB8AC3E}">
-        <p14:creationId xmlns:p14="http://schemas.microsoft.com/office/powerpoint/2010/main" val="1368255976"/>
+        <p14:creationId xmlns:p14="http://schemas.microsoft.com/office/powerpoint/2010/main" xmlns="" val="1368255976"/>
       </p:ext>
     </p:extLst>
   </p:cSld>
@@ -2200,7 +1913,7 @@
     </p:spTree>
     <p:extLst>
       <p:ext uri="{BB962C8B-B14F-4D97-AF65-F5344CB8AC3E}">
-        <p14:creationId xmlns:p14="http://schemas.microsoft.com/office/powerpoint/2010/main" val="3091952112"/>
+        <p14:creationId xmlns:p14="http://schemas.microsoft.com/office/powerpoint/2010/main" xmlns="" val="3091952112"/>
       </p:ext>
     </p:extLst>
   </p:cSld>
@@ -2343,7 +2056,7 @@
     </p:spTree>
     <p:extLst>
       <p:ext uri="{BB962C8B-B14F-4D97-AF65-F5344CB8AC3E}">
-        <p14:creationId xmlns:p14="http://schemas.microsoft.com/office/powerpoint/2010/main" val="1420271675"/>
+        <p14:creationId xmlns:p14="http://schemas.microsoft.com/office/powerpoint/2010/main" xmlns="" val="1420271675"/>
       </p:ext>
     </p:extLst>
   </p:cSld>
@@ -2635,7 +2348,7 @@
     </p:spTree>
     <p:extLst>
       <p:ext uri="{BB962C8B-B14F-4D97-AF65-F5344CB8AC3E}">
-        <p14:creationId xmlns:p14="http://schemas.microsoft.com/office/powerpoint/2010/main" val="519396750"/>
+        <p14:creationId xmlns:p14="http://schemas.microsoft.com/office/powerpoint/2010/main" xmlns="" val="519396750"/>
       </p:ext>
     </p:extLst>
   </p:cSld>
@@ -2748,7 +2461,7 @@
     </p:spTree>
     <p:extLst>
       <p:ext uri="{BB962C8B-B14F-4D97-AF65-F5344CB8AC3E}">
-        <p14:creationId xmlns:p14="http://schemas.microsoft.com/office/powerpoint/2010/main" val="2492857078"/>
+        <p14:creationId xmlns:p14="http://schemas.microsoft.com/office/powerpoint/2010/main" xmlns="" val="2492857078"/>
       </p:ext>
     </p:extLst>
   </p:cSld>
@@ -2868,7 +2581,7 @@
     </p:spTree>
     <p:extLst>
       <p:ext uri="{BB962C8B-B14F-4D97-AF65-F5344CB8AC3E}">
-        <p14:creationId xmlns:p14="http://schemas.microsoft.com/office/powerpoint/2010/main" val="3161249615"/>
+        <p14:creationId xmlns:p14="http://schemas.microsoft.com/office/powerpoint/2010/main" xmlns="" val="3161249615"/>
       </p:ext>
     </p:extLst>
   </p:cSld>
@@ -2946,15 +2659,7 @@
             </a:pPr>
             <a:r>
               <a:rPr lang="en-US" dirty="0" smtClean="0"/>
-              <a:t>The Biodiversity Heritage Library (BHL) is a consortium of </a:t>
-            </a:r>
-            <a:r>
-              <a:rPr lang="en-US" dirty="0" smtClean="0"/>
-              <a:t>libraries </a:t>
-            </a:r>
-            <a:r>
-              <a:rPr lang="en-US" dirty="0" smtClean="0"/>
-              <a:t>that cooperate to do two things:</a:t>
+              <a:t>The Biodiversity Heritage Library (BHL) is a consortium of libraries that cooperate to do two things:</a:t>
             </a:r>
             <a:r>
               <a:rPr lang="en-US" baseline="0" dirty="0" smtClean="0"/>
@@ -2962,11 +2667,7 @@
             </a:r>
             <a:r>
               <a:rPr lang="en-US" dirty="0" smtClean="0"/>
-              <a:t>digitize </a:t>
-            </a:r>
-            <a:r>
-              <a:rPr lang="en-US" dirty="0" smtClean="0"/>
-              <a:t>the</a:t>
+              <a:t>digitize the</a:t>
             </a:r>
             <a:r>
               <a:rPr lang="en-US" baseline="0" dirty="0" smtClean="0"/>
@@ -2974,17 +2675,8 @@
             </a:r>
             <a:r>
               <a:rPr lang="en-US" dirty="0" smtClean="0"/>
-              <a:t>biodiversity </a:t>
-            </a:r>
-            <a:r>
-              <a:rPr lang="en-US" dirty="0" smtClean="0"/>
-              <a:t>literature held in their collections and 2) make that literature available for open access and </a:t>
-            </a:r>
-            <a:r>
-              <a:rPr lang="en-US" dirty="0" smtClean="0"/>
-              <a:t>reuse.</a:t>
-            </a:r>
-            <a:endParaRPr lang="en-US" dirty="0" smtClean="0"/>
+              <a:t>biodiversity literature held in their collections and 2) make that literature available for open access and reuse.</a:t>
+            </a:r>
           </a:p>
           <a:p>
             <a:pPr marL="0" marR="0" indent="0" algn="l" defTabSz="457200" rtl="0" eaLnBrk="1" fontAlgn="auto" latinLnBrk="0" hangingPunct="1">
@@ -3074,11 +2766,7 @@
             </a:r>
             <a:r>
               <a:rPr lang="en-US" baseline="0" dirty="0" smtClean="0"/>
-              <a:t> content to a wide variety of partners, including</a:t>
-            </a:r>
-            <a:r>
-              <a:rPr lang="en-US" baseline="0" dirty="0" smtClean="0"/>
-              <a:t>:</a:t>
+              <a:t> content to a wide variety of partners, including:</a:t>
             </a:r>
           </a:p>
           <a:p>
@@ -3195,11 +2883,7 @@
             </a:pPr>
             <a:r>
               <a:rPr lang="en-US" baseline="0" dirty="0" smtClean="0"/>
-              <a:t> Digital Public Library of America (DPLA</a:t>
-            </a:r>
-            <a:r>
-              <a:rPr lang="en-US" baseline="0" dirty="0" smtClean="0"/>
-              <a:t>)</a:t>
+              <a:t> Digital Public Library of America (DPLA)</a:t>
             </a:r>
           </a:p>
           <a:p>
@@ -3224,7 +2908,6 @@
               <a:rPr lang="en-US" baseline="0" dirty="0" smtClean="0"/>
               <a:t> Internet Archive</a:t>
             </a:r>
-            <a:endParaRPr lang="en-US" baseline="0" dirty="0" smtClean="0"/>
           </a:p>
         </p:txBody>
       </p:sp>
@@ -3255,7 +2938,7 @@
     </p:spTree>
     <p:extLst>
       <p:ext uri="{BB962C8B-B14F-4D97-AF65-F5344CB8AC3E}">
-        <p14:creationId xmlns:p14="http://schemas.microsoft.com/office/powerpoint/2010/main" val="2163336662"/>
+        <p14:creationId xmlns:p14="http://schemas.microsoft.com/office/powerpoint/2010/main" xmlns="" val="2163336662"/>
       </p:ext>
     </p:extLst>
   </p:cSld>
@@ -3428,7 +3111,7 @@
     </p:spTree>
     <p:extLst>
       <p:ext uri="{BB962C8B-B14F-4D97-AF65-F5344CB8AC3E}">
-        <p14:creationId xmlns:p14="http://schemas.microsoft.com/office/powerpoint/2010/main" val="1254822975"/>
+        <p14:creationId xmlns:p14="http://schemas.microsoft.com/office/powerpoint/2010/main" xmlns="" val="1254822975"/>
       </p:ext>
     </p:extLst>
   </p:cSld>
@@ -3562,7 +3245,7 @@
     </p:spTree>
     <p:extLst>
       <p:ext uri="{BB962C8B-B14F-4D97-AF65-F5344CB8AC3E}">
-        <p14:creationId xmlns:p14="http://schemas.microsoft.com/office/powerpoint/2010/main" val="3860997776"/>
+        <p14:creationId xmlns:p14="http://schemas.microsoft.com/office/powerpoint/2010/main" xmlns="" val="3860997776"/>
       </p:ext>
     </p:extLst>
   </p:cSld>
@@ -3971,7 +3654,7 @@
     </p:spTree>
     <p:extLst>
       <p:ext uri="{BB962C8B-B14F-4D97-AF65-F5344CB8AC3E}">
-        <p14:creationId xmlns:p14="http://schemas.microsoft.com/office/powerpoint/2010/main" val="881293455"/>
+        <p14:creationId xmlns:p14="http://schemas.microsoft.com/office/powerpoint/2010/main" xmlns="" val="881293455"/>
       </p:ext>
     </p:extLst>
   </p:cSld>
@@ -4580,13 +4263,8 @@
           <a:p>
             <a:r>
               <a:rPr lang="en-US" baseline="0" dirty="0" smtClean="0"/>
-              <a:t>2) A discussion of the various ways that BHL makes its data available for reuse and </a:t>
-            </a:r>
-            <a:r>
-              <a:rPr lang="en-US" baseline="0" dirty="0" smtClean="0"/>
-              <a:t>analysis.  This is what I really want to show you.</a:t>
-            </a:r>
-            <a:endParaRPr lang="en-US" baseline="0" dirty="0" smtClean="0"/>
+              <a:t>2) A discussion of the various ways that BHL makes its data available for reuse and analysis.  This is what I really want to show you.</a:t>
+            </a:r>
           </a:p>
           <a:p>
             <a:pPr marL="0" marR="0" indent="0" algn="l" defTabSz="457200" rtl="0" eaLnBrk="1" fontAlgn="auto" latinLnBrk="0" hangingPunct="1">
@@ -4647,7 +4325,7 @@
     </p:spTree>
     <p:extLst>
       <p:ext uri="{BB962C8B-B14F-4D97-AF65-F5344CB8AC3E}">
-        <p14:creationId xmlns:p14="http://schemas.microsoft.com/office/powerpoint/2010/main" val="2796509056"/>
+        <p14:creationId xmlns:p14="http://schemas.microsoft.com/office/powerpoint/2010/main" xmlns="" val="2796509056"/>
       </p:ext>
     </p:extLst>
   </p:cSld>
@@ -4725,11 +4403,7 @@
             </a:r>
             <a:r>
               <a:rPr lang="en-US" baseline="0" smtClean="0"/>
-              <a:t>the </a:t>
-            </a:r>
-            <a:r>
-              <a:rPr lang="en-US" baseline="0" smtClean="0"/>
-              <a:t>elements in </a:t>
+              <a:t>the elements in </a:t>
             </a:r>
             <a:r>
               <a:rPr lang="en-US" baseline="0" dirty="0" smtClean="0"/>
@@ -4797,7 +4471,7 @@
     </p:spTree>
     <p:extLst>
       <p:ext uri="{BB962C8B-B14F-4D97-AF65-F5344CB8AC3E}">
-        <p14:creationId xmlns:p14="http://schemas.microsoft.com/office/powerpoint/2010/main" val="3924599026"/>
+        <p14:creationId xmlns:p14="http://schemas.microsoft.com/office/powerpoint/2010/main" xmlns="" val="3924599026"/>
       </p:ext>
     </p:extLst>
   </p:cSld>
@@ -4870,19 +4544,7 @@
             </a:r>
             <a:r>
               <a:rPr lang="en-US" baseline="0" dirty="0" smtClean="0"/>
-              <a:t> </a:t>
-            </a:r>
-            <a:r>
-              <a:rPr lang="en-US" baseline="0" dirty="0" smtClean="0"/>
-              <a:t>that describes </a:t>
-            </a:r>
-            <a:r>
-              <a:rPr lang="en-US" baseline="0" dirty="0" smtClean="0"/>
-              <a:t>items in the BHL collection.  </a:t>
-            </a:r>
-            <a:r>
-              <a:rPr lang="en-US" baseline="0" dirty="0" smtClean="0"/>
-              <a:t>For example:</a:t>
+              <a:t> that describes items in the BHL collection.  For example:</a:t>
             </a:r>
           </a:p>
           <a:p>
@@ -4894,11 +4556,7 @@
             </a:pPr>
             <a:r>
               <a:rPr lang="en-US" baseline="0" dirty="0" smtClean="0"/>
-              <a:t>Bibliographic information for monographs, journals, and </a:t>
-            </a:r>
-            <a:r>
-              <a:rPr lang="en-US" baseline="0" dirty="0" smtClean="0"/>
-              <a:t>articles.</a:t>
+              <a:t>Bibliographic information for monographs, journals, and articles.</a:t>
             </a:r>
           </a:p>
           <a:p>
@@ -4909,7 +4567,6 @@
               <a:rPr lang="en-US" baseline="0" dirty="0" smtClean="0"/>
               <a:t>Pagination data.</a:t>
             </a:r>
-            <a:endParaRPr lang="en-US" baseline="0" dirty="0" smtClean="0"/>
           </a:p>
           <a:p>
             <a:pPr marL="228600" indent="-228600">
@@ -4917,31 +4574,7 @@
             </a:pPr>
             <a:r>
               <a:rPr lang="en-US" baseline="0" dirty="0" smtClean="0"/>
-              <a:t>Scientific names.   </a:t>
-            </a:r>
-            <a:r>
-              <a:rPr lang="en-US" baseline="0" dirty="0" smtClean="0"/>
-              <a:t>With the help that of the Global </a:t>
-            </a:r>
-            <a:r>
-              <a:rPr lang="en-US" baseline="0" dirty="0" smtClean="0"/>
-              <a:t>Names </a:t>
-            </a:r>
-            <a:r>
-              <a:rPr lang="en-US" baseline="0" dirty="0" smtClean="0"/>
-              <a:t>project, BHL </a:t>
-            </a:r>
-            <a:r>
-              <a:rPr lang="en-US" baseline="0" dirty="0" smtClean="0"/>
-              <a:t>has recorded 177+ million occurrences of scientific names </a:t>
-            </a:r>
-            <a:r>
-              <a:rPr lang="en-US" baseline="0" dirty="0" smtClean="0"/>
-              <a:t>within the text of the </a:t>
-            </a:r>
-            <a:r>
-              <a:rPr lang="en-US" baseline="0" dirty="0" smtClean="0"/>
-              <a:t>collection.</a:t>
+              <a:t>Scientific names.   With the help that of the Global Names project, BHL has recorded 177+ million occurrences of scientific names within the text of the collection.</a:t>
             </a:r>
           </a:p>
           <a:p>
@@ -4994,7 +4627,7 @@
     </p:spTree>
     <p:extLst>
       <p:ext uri="{BB962C8B-B14F-4D97-AF65-F5344CB8AC3E}">
-        <p14:creationId xmlns:p14="http://schemas.microsoft.com/office/powerpoint/2010/main" val="1591452945"/>
+        <p14:creationId xmlns:p14="http://schemas.microsoft.com/office/powerpoint/2010/main" xmlns="" val="1591452945"/>
       </p:ext>
     </p:extLst>
   </p:cSld>
@@ -5170,15 +4803,7 @@
             </a:pPr>
             <a:r>
               <a:rPr lang="en-US" baseline="0" dirty="0" smtClean="0"/>
-              <a:t>Individual scans are served via BHL </a:t>
-            </a:r>
-            <a:r>
-              <a:rPr lang="en-US" baseline="0" dirty="0" smtClean="0"/>
-              <a:t>as </a:t>
-            </a:r>
-            <a:r>
-              <a:rPr lang="en-US" baseline="0" dirty="0" smtClean="0"/>
-              <a:t>high-resolution JPGs.</a:t>
+              <a:t>Individual scans are served via BHL as high-resolution JPGs.</a:t>
             </a:r>
           </a:p>
           <a:p>
@@ -5233,7 +4858,7 @@
     </p:spTree>
     <p:extLst>
       <p:ext uri="{BB962C8B-B14F-4D97-AF65-F5344CB8AC3E}">
-        <p14:creationId xmlns:p14="http://schemas.microsoft.com/office/powerpoint/2010/main" val="1659397798"/>
+        <p14:creationId xmlns:p14="http://schemas.microsoft.com/office/powerpoint/2010/main" xmlns="" val="1659397798"/>
       </p:ext>
     </p:extLst>
   </p:cSld>
@@ -5316,11 +4941,7 @@
           <a:p>
             <a:r>
               <a:rPr lang="en-US" baseline="0" dirty="0" smtClean="0"/>
-              <a:t>(</a:t>
-            </a:r>
-            <a:r>
-              <a:rPr lang="en-US" baseline="0" dirty="0" smtClean="0"/>
-              <a:t>The 17 billion estimate is based on an average book size of 270 pages.  A simple algorithm was used to count the words in the 260 books in BHL with exactly 270 pages.  The average number of words in those 260 books was 81,000.  Applying this average number of words to all books in BHL produces the 17 billion estimate.)</a:t>
+              <a:t>(The 17 billion estimate is based on an average book size of 270 pages.  A simple algorithm was used to count the words in the 260 books in BHL with exactly 270 pages.  The average number of words in those 260 books was 81,000.  Applying this average number of words to all books in BHL produces the 17 billion estimate.)</a:t>
             </a:r>
             <a:endParaRPr lang="en-US" dirty="0" smtClean="0"/>
           </a:p>
@@ -5359,7 +4980,7 @@
     </p:spTree>
     <p:extLst>
       <p:ext uri="{BB962C8B-B14F-4D97-AF65-F5344CB8AC3E}">
-        <p14:creationId xmlns:p14="http://schemas.microsoft.com/office/powerpoint/2010/main" val="1195562963"/>
+        <p14:creationId xmlns:p14="http://schemas.microsoft.com/office/powerpoint/2010/main" xmlns="" val="1195562963"/>
       </p:ext>
     </p:extLst>
   </p:cSld>
@@ -5420,11 +5041,7 @@
           <a:p>
             <a:r>
               <a:rPr lang="en-US" baseline="0" dirty="0" smtClean="0"/>
-              <a:t>How </a:t>
-            </a:r>
-            <a:r>
-              <a:rPr lang="en-US" baseline="0" dirty="0" smtClean="0"/>
-              <a:t>do you access and use BHL data?</a:t>
+              <a:t>How do you access and use BHL data?</a:t>
             </a:r>
             <a:endParaRPr lang="en-US" dirty="0" smtClean="0"/>
           </a:p>
@@ -5442,29 +5059,8 @@
             </a:r>
             <a:r>
               <a:rPr lang="en-US" baseline="0" dirty="0" smtClean="0"/>
-              <a:t>to </a:t>
-            </a:r>
-            <a:r>
-              <a:rPr lang="en-US" baseline="0" dirty="0" smtClean="0"/>
-              <a:t>do it, </a:t>
-            </a:r>
-            <a:r>
-              <a:rPr lang="en-US" baseline="0" dirty="0" smtClean="0"/>
-              <a:t>and there are multiple formats in which the </a:t>
-            </a:r>
-            <a:r>
-              <a:rPr lang="en-US" baseline="0" dirty="0" smtClean="0"/>
-              <a:t>data </a:t>
-            </a:r>
-            <a:r>
-              <a:rPr lang="en-US" baseline="0" dirty="0" smtClean="0"/>
-              <a:t>is packaged. </a:t>
-            </a:r>
-            <a:r>
-              <a:rPr lang="en-US" baseline="0" dirty="0" smtClean="0"/>
-              <a:t> To get the data, you can:</a:t>
-            </a:r>
-            <a:endParaRPr lang="en-US" baseline="0" dirty="0" smtClean="0"/>
+              <a:t>to do it, and there are multiple formats in which the data is packaged.  To get the data, you can:</a:t>
+            </a:r>
           </a:p>
           <a:p>
             <a:endParaRPr lang="en-US" baseline="0" dirty="0" smtClean="0"/>
@@ -5475,11 +5071,7 @@
             </a:pPr>
             <a:r>
               <a:rPr lang="en-US" baseline="0" dirty="0" smtClean="0"/>
-              <a:t>Download one of the BHL data </a:t>
-            </a:r>
-            <a:r>
-              <a:rPr lang="en-US" baseline="0" dirty="0" smtClean="0"/>
-              <a:t>exports</a:t>
+              <a:t>Download one of the BHL data exports</a:t>
             </a:r>
           </a:p>
           <a:p>
@@ -5488,11 +5080,7 @@
             </a:pPr>
             <a:r>
               <a:rPr lang="en-US" baseline="0" dirty="0" smtClean="0"/>
-              <a:t>Harvest data via the Open </a:t>
-            </a:r>
-            <a:r>
-              <a:rPr lang="en-US" baseline="0" dirty="0" smtClean="0"/>
-              <a:t>Archive Initiative Protocol for Metadata Harvesting (OAI-PMH)</a:t>
+              <a:t>Harvest data via the Open Archive Initiative Protocol for Metadata Harvesting (OAI-PMH)</a:t>
             </a:r>
           </a:p>
           <a:p>
@@ -5501,11 +5089,7 @@
             </a:pPr>
             <a:r>
               <a:rPr lang="en-US" baseline="0" dirty="0" smtClean="0"/>
-              <a:t>Request data via the BHL Application </a:t>
-            </a:r>
-            <a:r>
-              <a:rPr lang="en-US" baseline="0" dirty="0" smtClean="0"/>
-              <a:t>Programming Interfaces (APIs)</a:t>
+              <a:t>Request data via the BHL Application Programming Interfaces (APIs)</a:t>
             </a:r>
           </a:p>
           <a:p>
@@ -5549,7 +5133,7 @@
     </p:spTree>
     <p:extLst>
       <p:ext uri="{BB962C8B-B14F-4D97-AF65-F5344CB8AC3E}">
-        <p14:creationId xmlns:p14="http://schemas.microsoft.com/office/powerpoint/2010/main" val="97680472"/>
+        <p14:creationId xmlns:p14="http://schemas.microsoft.com/office/powerpoint/2010/main" xmlns="" val="97680472"/>
       </p:ext>
     </p:extLst>
   </p:cSld>
@@ -5631,15 +5215,7 @@
             </a:r>
             <a:r>
               <a:rPr lang="en-US" sz="1200" baseline="0" dirty="0" smtClean="0"/>
-              <a:t> BHL data </a:t>
-            </a:r>
-            <a:r>
-              <a:rPr lang="en-US" sz="1200" baseline="0" dirty="0" smtClean="0"/>
-              <a:t>is the </a:t>
-            </a:r>
-            <a:r>
-              <a:rPr lang="en-US" sz="1200" baseline="0" dirty="0" smtClean="0"/>
-              <a:t>Data Exports.</a:t>
+              <a:t> BHL data is the Data Exports.</a:t>
             </a:r>
           </a:p>
           <a:p>
@@ -5682,11 +5258,7 @@
             </a:pPr>
             <a:r>
               <a:rPr lang="en-US" sz="1200" b="1" baseline="0" dirty="0" smtClean="0"/>
-              <a:t>The exports are </a:t>
-            </a:r>
-            <a:r>
-              <a:rPr lang="en-US" sz="1200" b="1" baseline="0" dirty="0" smtClean="0"/>
-              <a:t>updated monthly, on or around the 1</a:t>
+              <a:t>The exports are updated monthly, on or around the 1</a:t>
             </a:r>
             <a:r>
               <a:rPr lang="en-US" sz="1200" b="1" baseline="30000" dirty="0" smtClean="0"/>
@@ -5694,15 +5266,7 @@
             </a:r>
             <a:r>
               <a:rPr lang="en-US" sz="1200" b="1" baseline="0" dirty="0" smtClean="0"/>
-              <a:t> of the month, and </a:t>
-            </a:r>
-            <a:r>
-              <a:rPr lang="en-US" sz="1200" b="1" baseline="0" dirty="0" smtClean="0"/>
-              <a:t>they contain data for the </a:t>
-            </a:r>
-            <a:r>
-              <a:rPr lang="en-US" sz="1200" b="1" baseline="0" dirty="0" smtClean="0"/>
-              <a:t>entire BHL collection.</a:t>
+              <a:t> of the month, and they contain data for the entire BHL collection.</a:t>
             </a:r>
             <a:endParaRPr lang="en-US" sz="1200" b="1" dirty="0" smtClean="0"/>
           </a:p>
@@ -5738,11 +5302,7 @@
           <a:p>
             <a:r>
               <a:rPr lang="en-US" sz="1200" baseline="0" dirty="0" smtClean="0"/>
-              <a:t>Besides the delimited text files, there are exports in three different formats used for bibliographic data exchange.  These </a:t>
-            </a:r>
-            <a:r>
-              <a:rPr lang="en-US" sz="1200" baseline="0" dirty="0" smtClean="0"/>
-              <a:t>are:</a:t>
+              <a:t>Besides the delimited text files, there are exports in three different formats used for bibliographic data exchange.  These are:</a:t>
             </a:r>
           </a:p>
           <a:p>
@@ -5755,11 +5315,7 @@
             </a:pPr>
             <a:r>
               <a:rPr lang="en-US" sz="1200" baseline="0" dirty="0" smtClean="0"/>
-              <a:t>RIS </a:t>
-            </a:r>
-            <a:r>
-              <a:rPr lang="en-US" sz="1200" baseline="0" dirty="0" smtClean="0"/>
-              <a:t>(typically used by reference managers like </a:t>
+              <a:t>RIS (typically used by reference managers like </a:t>
             </a:r>
             <a:r>
               <a:rPr lang="en-US" sz="1200" baseline="0" dirty="0" err="1" smtClean="0"/>
@@ -5775,11 +5331,7 @@
             </a:r>
             <a:r>
               <a:rPr lang="en-US" sz="1200" baseline="0" dirty="0" smtClean="0"/>
-              <a:t>, and </a:t>
-            </a:r>
-            <a:r>
-              <a:rPr lang="en-US" sz="1200" baseline="0" dirty="0" smtClean="0"/>
-              <a:t>EndNote)</a:t>
+              <a:t>, and EndNote)</a:t>
             </a:r>
           </a:p>
           <a:p>
@@ -5789,23 +5341,7 @@
             </a:pPr>
             <a:r>
               <a:rPr lang="en-US" sz="1200" baseline="0" dirty="0" smtClean="0"/>
-              <a:t>MODS </a:t>
-            </a:r>
-            <a:r>
-              <a:rPr lang="en-US" sz="1200" baseline="0" dirty="0" smtClean="0"/>
-              <a:t>(</a:t>
-            </a:r>
-            <a:r>
-              <a:rPr lang="en-US" sz="1200" baseline="0" dirty="0" smtClean="0"/>
-              <a:t>an </a:t>
-            </a:r>
-            <a:r>
-              <a:rPr lang="en-US" sz="1200" baseline="0" dirty="0" smtClean="0"/>
-              <a:t>XML schema from Library of Congress that is similar to MARC</a:t>
-            </a:r>
-            <a:r>
-              <a:rPr lang="en-US" sz="1200" baseline="0" dirty="0" smtClean="0"/>
-              <a:t>)</a:t>
+              <a:t>MODS (an XML schema from Library of Congress that is similar to MARC)</a:t>
             </a:r>
           </a:p>
           <a:p>
@@ -5819,29 +5355,16 @@
             </a:r>
             <a:r>
               <a:rPr lang="en-US" sz="1200" baseline="0" dirty="0" smtClean="0"/>
-              <a:t> </a:t>
-            </a:r>
+              <a:t> (an older format rarely used).  </a:t>
+            </a:r>
+          </a:p>
+          <a:p>
+            <a:endParaRPr lang="en-US" sz="1200" baseline="0" dirty="0" smtClean="0"/>
+          </a:p>
+          <a:p>
             <a:r>
               <a:rPr lang="en-US" sz="1200" baseline="0" dirty="0" smtClean="0"/>
-              <a:t>(an older format rarely used).  </a:t>
-            </a:r>
-            <a:endParaRPr lang="en-US" sz="1200" baseline="0" dirty="0" smtClean="0"/>
-          </a:p>
-          <a:p>
-            <a:endParaRPr lang="en-US" sz="1200" baseline="0" dirty="0" smtClean="0"/>
-          </a:p>
-          <a:p>
-            <a:r>
-              <a:rPr lang="en-US" sz="1200" baseline="0" dirty="0" smtClean="0"/>
-              <a:t>None </a:t>
-            </a:r>
-            <a:r>
-              <a:rPr lang="en-US" sz="1200" baseline="0" dirty="0" smtClean="0"/>
-              <a:t>of these include page metadata, names, or page text.  They contain </a:t>
-            </a:r>
-            <a:r>
-              <a:rPr lang="en-US" sz="1200" baseline="0" dirty="0" smtClean="0"/>
-              <a:t>only bibliographic metadata.</a:t>
+              <a:t>None of these include page metadata, names, or page text.  They contain only bibliographic metadata.</a:t>
             </a:r>
           </a:p>
           <a:p>
@@ -5852,7 +5375,6 @@
               <a:rPr lang="en-US" sz="1200" baseline="0" dirty="0" smtClean="0"/>
               <a:t>All of the export files can be downloaded from the BHL “data” link shown here.  Simply browse to that link to view the files, and download the ones you need.</a:t>
             </a:r>
-            <a:endParaRPr lang="en-US" sz="1200" baseline="0" dirty="0" smtClean="0"/>
           </a:p>
         </p:txBody>
       </p:sp>
@@ -5883,7 +5405,7 @@
     </p:spTree>
     <p:extLst>
       <p:ext uri="{BB962C8B-B14F-4D97-AF65-F5344CB8AC3E}">
-        <p14:creationId xmlns:p14="http://schemas.microsoft.com/office/powerpoint/2010/main" val="1462193928"/>
+        <p14:creationId xmlns:p14="http://schemas.microsoft.com/office/powerpoint/2010/main" xmlns="" val="1462193928"/>
       </p:ext>
     </p:extLst>
   </p:cSld>
@@ -5922,7 +5444,7 @@
           <a:blip r:embed="rId2" cstate="print">
             <a:extLst>
               <a:ext uri="{28A0092B-C50C-407E-A947-70E740481C1C}">
-                <a14:useLocalDpi xmlns:a14="http://schemas.microsoft.com/office/drawing/2010/main" val="0"/>
+                <a14:useLocalDpi xmlns:a14="http://schemas.microsoft.com/office/drawing/2010/main" xmlns="" val="0"/>
               </a:ext>
             </a:extLst>
           </a:blip>
@@ -5946,14 +5468,14 @@
           <a:effectLst/>
           <a:extLst>
             <a:ext uri="{909E8E84-426E-40DD-AFC4-6F175D3DCCD1}">
-              <a14:hiddenFill xmlns:a14="http://schemas.microsoft.com/office/drawing/2010/main">
+              <a14:hiddenFill xmlns:a14="http://schemas.microsoft.com/office/drawing/2010/main" xmlns="">
                 <a:solidFill>
                   <a:schemeClr val="accent1"/>
                 </a:solidFill>
               </a14:hiddenFill>
             </a:ext>
             <a:ext uri="{91240B29-F687-4F45-9708-019B960494DF}">
-              <a14:hiddenLine xmlns:a14="http://schemas.microsoft.com/office/drawing/2010/main" w="9525">
+              <a14:hiddenLine xmlns:a14="http://schemas.microsoft.com/office/drawing/2010/main" xmlns="" w="9525">
                 <a:solidFill>
                   <a:schemeClr val="tx1"/>
                 </a:solidFill>
@@ -5963,7 +5485,7 @@
               </a14:hiddenLine>
             </a:ext>
             <a:ext uri="{AF507438-7753-43E0-B8FC-AC1667EBCBE1}">
-              <a14:hiddenEffects xmlns:a14="http://schemas.microsoft.com/office/drawing/2010/main">
+              <a14:hiddenEffects xmlns:a14="http://schemas.microsoft.com/office/drawing/2010/main" xmlns="">
                 <a:effectLst>
                   <a:outerShdw dist="35921" dir="2700000" algn="ctr" rotWithShape="0">
                     <a:schemeClr val="bg2"/>
@@ -5986,7 +5508,7 @@
           <a:blip r:embed="rId3" cstate="print">
             <a:extLst>
               <a:ext uri="{28A0092B-C50C-407E-A947-70E740481C1C}">
-                <a14:useLocalDpi xmlns:a14="http://schemas.microsoft.com/office/drawing/2010/main" val="0"/>
+                <a14:useLocalDpi xmlns:a14="http://schemas.microsoft.com/office/drawing/2010/main" xmlns="" val="0"/>
               </a:ext>
             </a:extLst>
           </a:blip>
@@ -6077,7 +5599,7 @@
     </p:spTree>
     <p:extLst>
       <p:ext uri="{BB962C8B-B14F-4D97-AF65-F5344CB8AC3E}">
-        <p14:creationId xmlns:p14="http://schemas.microsoft.com/office/powerpoint/2010/main" val="2478967282"/>
+        <p14:creationId xmlns:p14="http://schemas.microsoft.com/office/powerpoint/2010/main" xmlns="" val="2478967282"/>
       </p:ext>
     </p:extLst>
   </p:cSld>
@@ -6162,7 +5684,7 @@
           <a:blip r:embed="rId2" cstate="print">
             <a:extLst>
               <a:ext uri="{28A0092B-C50C-407E-A947-70E740481C1C}">
-                <a14:useLocalDpi xmlns:a14="http://schemas.microsoft.com/office/drawing/2010/main" val="0"/>
+                <a14:useLocalDpi xmlns:a14="http://schemas.microsoft.com/office/drawing/2010/main" xmlns="" val="0"/>
               </a:ext>
             </a:extLst>
           </a:blip>
@@ -6516,7 +6038,7 @@
     </p:spTree>
     <p:extLst>
       <p:ext uri="{BB962C8B-B14F-4D97-AF65-F5344CB8AC3E}">
-        <p14:creationId xmlns:p14="http://schemas.microsoft.com/office/powerpoint/2010/main" val="1649327088"/>
+        <p14:creationId xmlns:p14="http://schemas.microsoft.com/office/powerpoint/2010/main" xmlns="" val="1649327088"/>
       </p:ext>
     </p:extLst>
   </p:cSld>
@@ -6941,7 +6463,7 @@
           <a:blip r:embed="rId2" cstate="print">
             <a:extLst>
               <a:ext uri="{28A0092B-C50C-407E-A947-70E740481C1C}">
-                <a14:useLocalDpi xmlns:a14="http://schemas.microsoft.com/office/drawing/2010/main" val="0"/>
+                <a14:useLocalDpi xmlns:a14="http://schemas.microsoft.com/office/drawing/2010/main" xmlns="" val="0"/>
               </a:ext>
             </a:extLst>
           </a:blip>
@@ -7005,7 +6527,7 @@
     </p:spTree>
     <p:extLst>
       <p:ext uri="{BB962C8B-B14F-4D97-AF65-F5344CB8AC3E}">
-        <p14:creationId xmlns:p14="http://schemas.microsoft.com/office/powerpoint/2010/main" val="1675475096"/>
+        <p14:creationId xmlns:p14="http://schemas.microsoft.com/office/powerpoint/2010/main" xmlns="" val="1675475096"/>
       </p:ext>
     </p:extLst>
   </p:cSld>
@@ -7090,7 +6612,7 @@
           <a:blip r:embed="rId2" cstate="print">
             <a:extLst>
               <a:ext uri="{28A0092B-C50C-407E-A947-70E740481C1C}">
-                <a14:useLocalDpi xmlns:a14="http://schemas.microsoft.com/office/drawing/2010/main" val="0"/>
+                <a14:useLocalDpi xmlns:a14="http://schemas.microsoft.com/office/drawing/2010/main" xmlns="" val="0"/>
               </a:ext>
             </a:extLst>
           </a:blip>
@@ -7154,7 +6676,7 @@
     </p:spTree>
     <p:extLst>
       <p:ext uri="{BB962C8B-B14F-4D97-AF65-F5344CB8AC3E}">
-        <p14:creationId xmlns:p14="http://schemas.microsoft.com/office/powerpoint/2010/main" val="3589482103"/>
+        <p14:creationId xmlns:p14="http://schemas.microsoft.com/office/powerpoint/2010/main" xmlns="" val="3589482103"/>
       </p:ext>
     </p:extLst>
   </p:cSld>
@@ -7257,7 +6779,7 @@
     </p:spTree>
     <p:extLst>
       <p:ext uri="{BB962C8B-B14F-4D97-AF65-F5344CB8AC3E}">
-        <p14:creationId xmlns:p14="http://schemas.microsoft.com/office/powerpoint/2010/main" val="3145854839"/>
+        <p14:creationId xmlns:p14="http://schemas.microsoft.com/office/powerpoint/2010/main" xmlns="" val="3145854839"/>
       </p:ext>
     </p:extLst>
   </p:cSld>
@@ -7493,7 +7015,7 @@
           <a:blip r:embed="rId2" cstate="print">
             <a:extLst>
               <a:ext uri="{28A0092B-C50C-407E-A947-70E740481C1C}">
-                <a14:useLocalDpi xmlns:a14="http://schemas.microsoft.com/office/drawing/2010/main" val="0"/>
+                <a14:useLocalDpi xmlns:a14="http://schemas.microsoft.com/office/drawing/2010/main" xmlns="" val="0"/>
               </a:ext>
             </a:extLst>
           </a:blip>
@@ -7560,7 +7082,7 @@
     </p:spTree>
     <p:extLst>
       <p:ext uri="{BB962C8B-B14F-4D97-AF65-F5344CB8AC3E}">
-        <p14:creationId xmlns:p14="http://schemas.microsoft.com/office/powerpoint/2010/main" val="2790897643"/>
+        <p14:creationId xmlns:p14="http://schemas.microsoft.com/office/powerpoint/2010/main" xmlns="" val="2790897643"/>
       </p:ext>
     </p:extLst>
   </p:cSld>
@@ -7645,7 +7167,7 @@
           <a:blip r:embed="rId2" cstate="print">
             <a:extLst>
               <a:ext uri="{28A0092B-C50C-407E-A947-70E740481C1C}">
-                <a14:useLocalDpi xmlns:a14="http://schemas.microsoft.com/office/drawing/2010/main" val="0"/>
+                <a14:useLocalDpi xmlns:a14="http://schemas.microsoft.com/office/drawing/2010/main" xmlns="" val="0"/>
               </a:ext>
             </a:extLst>
           </a:blip>
@@ -7709,7 +7231,7 @@
     </p:spTree>
     <p:extLst>
       <p:ext uri="{BB962C8B-B14F-4D97-AF65-F5344CB8AC3E}">
-        <p14:creationId xmlns:p14="http://schemas.microsoft.com/office/powerpoint/2010/main" val="2318148184"/>
+        <p14:creationId xmlns:p14="http://schemas.microsoft.com/office/powerpoint/2010/main" xmlns="" val="2318148184"/>
       </p:ext>
     </p:extLst>
   </p:cSld>
@@ -7794,7 +7316,7 @@
           <a:blip r:embed="rId2" cstate="print">
             <a:extLst>
               <a:ext uri="{28A0092B-C50C-407E-A947-70E740481C1C}">
-                <a14:useLocalDpi xmlns:a14="http://schemas.microsoft.com/office/drawing/2010/main" val="0"/>
+                <a14:useLocalDpi xmlns:a14="http://schemas.microsoft.com/office/drawing/2010/main" xmlns="" val="0"/>
               </a:ext>
             </a:extLst>
           </a:blip>
@@ -7858,7 +7380,7 @@
     </p:spTree>
     <p:extLst>
       <p:ext uri="{BB962C8B-B14F-4D97-AF65-F5344CB8AC3E}">
-        <p14:creationId xmlns:p14="http://schemas.microsoft.com/office/powerpoint/2010/main" val="20454123"/>
+        <p14:creationId xmlns:p14="http://schemas.microsoft.com/office/powerpoint/2010/main" xmlns="" val="20454123"/>
       </p:ext>
     </p:extLst>
   </p:cSld>
@@ -7943,7 +7465,7 @@
           <a:blip r:embed="rId2" cstate="print">
             <a:extLst>
               <a:ext uri="{28A0092B-C50C-407E-A947-70E740481C1C}">
-                <a14:useLocalDpi xmlns:a14="http://schemas.microsoft.com/office/drawing/2010/main" val="0"/>
+                <a14:useLocalDpi xmlns:a14="http://schemas.microsoft.com/office/drawing/2010/main" xmlns="" val="0"/>
               </a:ext>
             </a:extLst>
           </a:blip>
@@ -8007,7 +7529,7 @@
     </p:spTree>
     <p:extLst>
       <p:ext uri="{BB962C8B-B14F-4D97-AF65-F5344CB8AC3E}">
-        <p14:creationId xmlns:p14="http://schemas.microsoft.com/office/powerpoint/2010/main" val="20454123"/>
+        <p14:creationId xmlns:p14="http://schemas.microsoft.com/office/powerpoint/2010/main" xmlns="" val="20454123"/>
       </p:ext>
     </p:extLst>
   </p:cSld>
@@ -8092,7 +7614,7 @@
           <a:blip r:embed="rId2" cstate="print">
             <a:extLst>
               <a:ext uri="{28A0092B-C50C-407E-A947-70E740481C1C}">
-                <a14:useLocalDpi xmlns:a14="http://schemas.microsoft.com/office/drawing/2010/main" val="0"/>
+                <a14:useLocalDpi xmlns:a14="http://schemas.microsoft.com/office/drawing/2010/main" xmlns="" val="0"/>
               </a:ext>
             </a:extLst>
           </a:blip>
@@ -8156,7 +7678,7 @@
     </p:spTree>
     <p:extLst>
       <p:ext uri="{BB962C8B-B14F-4D97-AF65-F5344CB8AC3E}">
-        <p14:creationId xmlns:p14="http://schemas.microsoft.com/office/powerpoint/2010/main" val="20454123"/>
+        <p14:creationId xmlns:p14="http://schemas.microsoft.com/office/powerpoint/2010/main" xmlns="" val="20454123"/>
       </p:ext>
     </p:extLst>
   </p:cSld>
@@ -8241,7 +7763,7 @@
           <a:blip r:embed="rId2" cstate="print">
             <a:extLst>
               <a:ext uri="{28A0092B-C50C-407E-A947-70E740481C1C}">
-                <a14:useLocalDpi xmlns:a14="http://schemas.microsoft.com/office/drawing/2010/main" val="0"/>
+                <a14:useLocalDpi xmlns:a14="http://schemas.microsoft.com/office/drawing/2010/main" xmlns="" val="0"/>
               </a:ext>
             </a:extLst>
           </a:blip>
@@ -8305,7 +7827,7 @@
     </p:spTree>
     <p:extLst>
       <p:ext uri="{BB962C8B-B14F-4D97-AF65-F5344CB8AC3E}">
-        <p14:creationId xmlns:p14="http://schemas.microsoft.com/office/powerpoint/2010/main" val="20454123"/>
+        <p14:creationId xmlns:p14="http://schemas.microsoft.com/office/powerpoint/2010/main" xmlns="" val="20454123"/>
       </p:ext>
     </p:extLst>
   </p:cSld>
@@ -8344,7 +7866,7 @@
           <a:blip r:embed="rId2" cstate="print">
             <a:extLst>
               <a:ext uri="{28A0092B-C50C-407E-A947-70E740481C1C}">
-                <a14:useLocalDpi xmlns:a14="http://schemas.microsoft.com/office/drawing/2010/main" val="0"/>
+                <a14:useLocalDpi xmlns:a14="http://schemas.microsoft.com/office/drawing/2010/main" xmlns="" val="0"/>
               </a:ext>
             </a:extLst>
           </a:blip>
@@ -8368,14 +7890,14 @@
           <a:effectLst/>
           <a:extLst>
             <a:ext uri="{909E8E84-426E-40DD-AFC4-6F175D3DCCD1}">
-              <a14:hiddenFill xmlns:a14="http://schemas.microsoft.com/office/drawing/2010/main">
+              <a14:hiddenFill xmlns:a14="http://schemas.microsoft.com/office/drawing/2010/main" xmlns="">
                 <a:solidFill>
                   <a:schemeClr val="accent1"/>
                 </a:solidFill>
               </a14:hiddenFill>
             </a:ext>
             <a:ext uri="{91240B29-F687-4F45-9708-019B960494DF}">
-              <a14:hiddenLine xmlns:a14="http://schemas.microsoft.com/office/drawing/2010/main" w="9525">
+              <a14:hiddenLine xmlns:a14="http://schemas.microsoft.com/office/drawing/2010/main" xmlns="" w="9525">
                 <a:solidFill>
                   <a:schemeClr val="tx1"/>
                 </a:solidFill>
@@ -8385,7 +7907,7 @@
               </a14:hiddenLine>
             </a:ext>
             <a:ext uri="{AF507438-7753-43E0-B8FC-AC1667EBCBE1}">
-              <a14:hiddenEffects xmlns:a14="http://schemas.microsoft.com/office/drawing/2010/main">
+              <a14:hiddenEffects xmlns:a14="http://schemas.microsoft.com/office/drawing/2010/main" xmlns="">
                 <a:effectLst>
                   <a:outerShdw dist="35921" dir="2700000" algn="ctr" rotWithShape="0">
                     <a:schemeClr val="bg2"/>
@@ -8443,7 +7965,7 @@
           <a:blip r:embed="rId3" cstate="print">
             <a:extLst>
               <a:ext uri="{28A0092B-C50C-407E-A947-70E740481C1C}">
-                <a14:useLocalDpi xmlns:a14="http://schemas.microsoft.com/office/drawing/2010/main" val="0"/>
+                <a14:useLocalDpi xmlns:a14="http://schemas.microsoft.com/office/drawing/2010/main" xmlns="" val="0"/>
               </a:ext>
             </a:extLst>
           </a:blip>
@@ -8464,7 +7986,7 @@
     </p:spTree>
     <p:extLst>
       <p:ext uri="{BB962C8B-B14F-4D97-AF65-F5344CB8AC3E}">
-        <p14:creationId xmlns:p14="http://schemas.microsoft.com/office/powerpoint/2010/main" val="2678290118"/>
+        <p14:creationId xmlns:p14="http://schemas.microsoft.com/office/powerpoint/2010/main" xmlns="" val="2678290118"/>
       </p:ext>
     </p:extLst>
   </p:cSld>
@@ -8549,7 +8071,7 @@
           <a:blip r:embed="rId2" cstate="print">
             <a:extLst>
               <a:ext uri="{28A0092B-C50C-407E-A947-70E740481C1C}">
-                <a14:useLocalDpi xmlns:a14="http://schemas.microsoft.com/office/drawing/2010/main" val="0"/>
+                <a14:useLocalDpi xmlns:a14="http://schemas.microsoft.com/office/drawing/2010/main" xmlns="" val="0"/>
               </a:ext>
             </a:extLst>
           </a:blip>
@@ -8613,7 +8135,7 @@
     </p:spTree>
     <p:extLst>
       <p:ext uri="{BB962C8B-B14F-4D97-AF65-F5344CB8AC3E}">
-        <p14:creationId xmlns:p14="http://schemas.microsoft.com/office/powerpoint/2010/main" val="1664427782"/>
+        <p14:creationId xmlns:p14="http://schemas.microsoft.com/office/powerpoint/2010/main" xmlns="" val="1664427782"/>
       </p:ext>
     </p:extLst>
   </p:cSld>
@@ -8698,7 +8220,7 @@
           <a:blip r:embed="rId2" cstate="print">
             <a:extLst>
               <a:ext uri="{28A0092B-C50C-407E-A947-70E740481C1C}">
-                <a14:useLocalDpi xmlns:a14="http://schemas.microsoft.com/office/drawing/2010/main" val="0"/>
+                <a14:useLocalDpi xmlns:a14="http://schemas.microsoft.com/office/drawing/2010/main" xmlns="" val="0"/>
               </a:ext>
             </a:extLst>
           </a:blip>
@@ -8728,7 +8250,7 @@
           <a:blip r:embed="rId3" cstate="print">
             <a:extLst>
               <a:ext uri="{28A0092B-C50C-407E-A947-70E740481C1C}">
-                <a14:useLocalDpi xmlns:a14="http://schemas.microsoft.com/office/drawing/2010/main" val="0"/>
+                <a14:useLocalDpi xmlns:a14="http://schemas.microsoft.com/office/drawing/2010/main" xmlns="" val="0"/>
               </a:ext>
             </a:extLst>
           </a:blip>
@@ -8749,7 +8271,7 @@
     </p:spTree>
     <p:extLst>
       <p:ext uri="{BB962C8B-B14F-4D97-AF65-F5344CB8AC3E}">
-        <p14:creationId xmlns:p14="http://schemas.microsoft.com/office/powerpoint/2010/main" val="1430256493"/>
+        <p14:creationId xmlns:p14="http://schemas.microsoft.com/office/powerpoint/2010/main" xmlns="" val="1430256493"/>
       </p:ext>
     </p:extLst>
   </p:cSld>
@@ -8834,7 +8356,7 @@
           <a:blip r:embed="rId2" cstate="print">
             <a:extLst>
               <a:ext uri="{28A0092B-C50C-407E-A947-70E740481C1C}">
-                <a14:useLocalDpi xmlns:a14="http://schemas.microsoft.com/office/drawing/2010/main" val="0"/>
+                <a14:useLocalDpi xmlns:a14="http://schemas.microsoft.com/office/drawing/2010/main" xmlns="" val="0"/>
               </a:ext>
             </a:extLst>
           </a:blip>
@@ -8968,7 +8490,7 @@
     </p:spTree>
     <p:extLst>
       <p:ext uri="{BB962C8B-B14F-4D97-AF65-F5344CB8AC3E}">
-        <p14:creationId xmlns:p14="http://schemas.microsoft.com/office/powerpoint/2010/main" val="3135013638"/>
+        <p14:creationId xmlns:p14="http://schemas.microsoft.com/office/powerpoint/2010/main" xmlns="" val="3135013638"/>
       </p:ext>
     </p:extLst>
   </p:cSld>
@@ -9053,7 +8575,7 @@
           <a:blip r:embed="rId2" cstate="print">
             <a:extLst>
               <a:ext uri="{28A0092B-C50C-407E-A947-70E740481C1C}">
-                <a14:useLocalDpi xmlns:a14="http://schemas.microsoft.com/office/drawing/2010/main" val="0"/>
+                <a14:useLocalDpi xmlns:a14="http://schemas.microsoft.com/office/drawing/2010/main" xmlns="" val="0"/>
               </a:ext>
             </a:extLst>
           </a:blip>
@@ -9217,7 +8739,7 @@
     </p:spTree>
     <p:extLst>
       <p:ext uri="{BB962C8B-B14F-4D97-AF65-F5344CB8AC3E}">
-        <p14:creationId xmlns:p14="http://schemas.microsoft.com/office/powerpoint/2010/main" val="3072449041"/>
+        <p14:creationId xmlns:p14="http://schemas.microsoft.com/office/powerpoint/2010/main" xmlns="" val="3072449041"/>
       </p:ext>
     </p:extLst>
   </p:cSld>
@@ -9302,7 +8824,7 @@
           <a:blip r:embed="rId2" cstate="print">
             <a:extLst>
               <a:ext uri="{28A0092B-C50C-407E-A947-70E740481C1C}">
-                <a14:useLocalDpi xmlns:a14="http://schemas.microsoft.com/office/drawing/2010/main" val="0"/>
+                <a14:useLocalDpi xmlns:a14="http://schemas.microsoft.com/office/drawing/2010/main" xmlns="" val="0"/>
               </a:ext>
             </a:extLst>
           </a:blip>
@@ -9474,7 +8996,7 @@
     </p:spTree>
     <p:extLst>
       <p:ext uri="{BB962C8B-B14F-4D97-AF65-F5344CB8AC3E}">
-        <p14:creationId xmlns:p14="http://schemas.microsoft.com/office/powerpoint/2010/main" val="994759595"/>
+        <p14:creationId xmlns:p14="http://schemas.microsoft.com/office/powerpoint/2010/main" xmlns="" val="994759595"/>
       </p:ext>
     </p:extLst>
   </p:cSld>
@@ -9559,7 +9081,7 @@
           <a:blip r:embed="rId2" cstate="print">
             <a:extLst>
               <a:ext uri="{28A0092B-C50C-407E-A947-70E740481C1C}">
-                <a14:useLocalDpi xmlns:a14="http://schemas.microsoft.com/office/drawing/2010/main" val="0"/>
+                <a14:useLocalDpi xmlns:a14="http://schemas.microsoft.com/office/drawing/2010/main" xmlns="" val="0"/>
               </a:ext>
             </a:extLst>
           </a:blip>
@@ -9762,7 +9284,7 @@
     </p:spTree>
     <p:extLst>
       <p:ext uri="{BB962C8B-B14F-4D97-AF65-F5344CB8AC3E}">
-        <p14:creationId xmlns:p14="http://schemas.microsoft.com/office/powerpoint/2010/main" val="2174007619"/>
+        <p14:creationId xmlns:p14="http://schemas.microsoft.com/office/powerpoint/2010/main" xmlns="" val="2174007619"/>
       </p:ext>
     </p:extLst>
   </p:cSld>
@@ -10032,7 +9554,7 @@
           <a:blip r:embed="rId2" cstate="print">
             <a:extLst>
               <a:ext uri="{28A0092B-C50C-407E-A947-70E740481C1C}">
-                <a14:useLocalDpi xmlns:a14="http://schemas.microsoft.com/office/drawing/2010/main" val="0"/>
+                <a14:useLocalDpi xmlns:a14="http://schemas.microsoft.com/office/drawing/2010/main" xmlns="" val="0"/>
               </a:ext>
             </a:extLst>
           </a:blip>
@@ -10096,7 +9618,7 @@
     </p:spTree>
     <p:extLst>
       <p:ext uri="{BB962C8B-B14F-4D97-AF65-F5344CB8AC3E}">
-        <p14:creationId xmlns:p14="http://schemas.microsoft.com/office/powerpoint/2010/main" val="4189991210"/>
+        <p14:creationId xmlns:p14="http://schemas.microsoft.com/office/powerpoint/2010/main" xmlns="" val="4189991210"/>
       </p:ext>
     </p:extLst>
   </p:cSld>
@@ -10245,7 +9767,7 @@
           <a:blip r:embed="rId2" cstate="print">
             <a:extLst>
               <a:ext uri="{28A0092B-C50C-407E-A947-70E740481C1C}">
-                <a14:useLocalDpi xmlns:a14="http://schemas.microsoft.com/office/drawing/2010/main" val="0"/>
+                <a14:useLocalDpi xmlns:a14="http://schemas.microsoft.com/office/drawing/2010/main" xmlns="" val="0"/>
               </a:ext>
             </a:extLst>
           </a:blip>
@@ -10409,7 +9931,7 @@
     </p:spTree>
     <p:extLst>
       <p:ext uri="{BB962C8B-B14F-4D97-AF65-F5344CB8AC3E}">
-        <p14:creationId xmlns:p14="http://schemas.microsoft.com/office/powerpoint/2010/main" val="2761385501"/>
+        <p14:creationId xmlns:p14="http://schemas.microsoft.com/office/powerpoint/2010/main" xmlns="" val="2761385501"/>
       </p:ext>
     </p:extLst>
   </p:cSld>
@@ -10745,7 +10267,7 @@
     </p:spTree>
     <p:extLst>
       <p:ext uri="{BB962C8B-B14F-4D97-AF65-F5344CB8AC3E}">
-        <p14:creationId xmlns:p14="http://schemas.microsoft.com/office/powerpoint/2010/main" val="879668439"/>
+        <p14:creationId xmlns:p14="http://schemas.microsoft.com/office/powerpoint/2010/main" xmlns="" val="879668439"/>
       </p:ext>
     </p:extLst>
   </p:cSld>
@@ -10835,7 +10357,7 @@
           <a:blip r:embed="rId23" cstate="print">
             <a:extLst>
               <a:ext uri="{28A0092B-C50C-407E-A947-70E740481C1C}">
-                <a14:useLocalDpi xmlns:a14="http://schemas.microsoft.com/office/drawing/2010/main" val="0"/>
+                <a14:useLocalDpi xmlns:a14="http://schemas.microsoft.com/office/drawing/2010/main" xmlns="" val="0"/>
               </a:ext>
             </a:extLst>
           </a:blip>
@@ -10856,7 +10378,7 @@
     </p:spTree>
     <p:extLst>
       <p:ext uri="{BB962C8B-B14F-4D97-AF65-F5344CB8AC3E}">
-        <p14:creationId xmlns:p14="http://schemas.microsoft.com/office/powerpoint/2010/main" val="3044589780"/>
+        <p14:creationId xmlns:p14="http://schemas.microsoft.com/office/powerpoint/2010/main" xmlns="" val="3044589780"/>
       </p:ext>
     </p:extLst>
   </p:cSld>
@@ -11521,7 +11043,7 @@
     </p:spTree>
     <p:extLst>
       <p:ext uri="{BB962C8B-B14F-4D97-AF65-F5344CB8AC3E}">
-        <p14:creationId xmlns:p14="http://schemas.microsoft.com/office/powerpoint/2010/main" val="2337725177"/>
+        <p14:creationId xmlns:p14="http://schemas.microsoft.com/office/powerpoint/2010/main" xmlns="" val="2337725177"/>
       </p:ext>
     </p:extLst>
   </p:cSld>
@@ -11606,11 +11128,7 @@
             </a:pPr>
             <a:r>
               <a:rPr lang="en-US" sz="2800" dirty="0" smtClean="0"/>
-              <a:t>HTTP </a:t>
-            </a:r>
-            <a:r>
-              <a:rPr lang="en-US" sz="2800" dirty="0" smtClean="0"/>
-              <a:t>GET requests </a:t>
+              <a:t>HTTP GET requests </a:t>
             </a:r>
           </a:p>
           <a:p>
@@ -11623,7 +11141,6 @@
               <a:rPr lang="en-US" sz="2800" dirty="0" smtClean="0"/>
               <a:t>XML responses</a:t>
             </a:r>
-            <a:endParaRPr lang="en-US" sz="2800" dirty="0" smtClean="0"/>
           </a:p>
           <a:p>
             <a:pPr>
@@ -11633,11 +11150,7 @@
             </a:pPr>
             <a:r>
               <a:rPr lang="en-US" sz="2800" dirty="0" smtClean="0"/>
-              <a:t>“</a:t>
-            </a:r>
-            <a:r>
-              <a:rPr lang="en-US" sz="2800" dirty="0" smtClean="0"/>
-              <a:t>verbs” used to request data</a:t>
+              <a:t>“verbs” used to request data</a:t>
             </a:r>
           </a:p>
           <a:p>
@@ -11755,7 +11268,7 @@
     </p:spTree>
     <p:extLst>
       <p:ext uri="{BB962C8B-B14F-4D97-AF65-F5344CB8AC3E}">
-        <p14:creationId xmlns:p14="http://schemas.microsoft.com/office/powerpoint/2010/main" val="3507990499"/>
+        <p14:creationId xmlns:p14="http://schemas.microsoft.com/office/powerpoint/2010/main" xmlns="" val="3507990499"/>
       </p:ext>
     </p:extLst>
   </p:cSld>
@@ -11898,7 +11411,7 @@
     </p:spTree>
     <p:extLst>
       <p:ext uri="{BB962C8B-B14F-4D97-AF65-F5344CB8AC3E}">
-        <p14:creationId xmlns:p14="http://schemas.microsoft.com/office/powerpoint/2010/main" val="4021351983"/>
+        <p14:creationId xmlns:p14="http://schemas.microsoft.com/office/powerpoint/2010/main" xmlns="" val="4021351983"/>
       </p:ext>
     </p:extLst>
   </p:cSld>
@@ -11993,7 +11506,7 @@
     </p:spTree>
     <p:extLst>
       <p:ext uri="{BB962C8B-B14F-4D97-AF65-F5344CB8AC3E}">
-        <p14:creationId xmlns:p14="http://schemas.microsoft.com/office/powerpoint/2010/main" val="269176317"/>
+        <p14:creationId xmlns:p14="http://schemas.microsoft.com/office/powerpoint/2010/main" xmlns="" val="269176317"/>
       </p:ext>
     </p:extLst>
   </p:cSld>
@@ -12118,7 +11631,6 @@
               <a:rPr lang="en-US" sz="2400" dirty="0" smtClean="0"/>
               <a:t>Metadata and Text</a:t>
             </a:r>
-            <a:endParaRPr lang="en-US" sz="2400" dirty="0" smtClean="0"/>
           </a:p>
           <a:p>
             <a:r>
@@ -12142,7 +11654,7 @@
     </p:spTree>
     <p:extLst>
       <p:ext uri="{BB962C8B-B14F-4D97-AF65-F5344CB8AC3E}">
-        <p14:creationId xmlns:p14="http://schemas.microsoft.com/office/powerpoint/2010/main" val="3617054278"/>
+        <p14:creationId xmlns:p14="http://schemas.microsoft.com/office/powerpoint/2010/main" xmlns="" val="3617054278"/>
       </p:ext>
     </p:extLst>
   </p:cSld>
@@ -12237,7 +11749,7 @@
     </p:spTree>
     <p:extLst>
       <p:ext uri="{BB962C8B-B14F-4D97-AF65-F5344CB8AC3E}">
-        <p14:creationId xmlns:p14="http://schemas.microsoft.com/office/powerpoint/2010/main" val="3057094392"/>
+        <p14:creationId xmlns:p14="http://schemas.microsoft.com/office/powerpoint/2010/main" xmlns="" val="3057094392"/>
       </p:ext>
     </p:extLst>
   </p:cSld>
@@ -13573,7 +13085,7 @@
     </p:spTree>
     <p:extLst>
       <p:ext uri="{BB962C8B-B14F-4D97-AF65-F5344CB8AC3E}">
-        <p14:creationId xmlns:p14="http://schemas.microsoft.com/office/powerpoint/2010/main" val="1445642125"/>
+        <p14:creationId xmlns:p14="http://schemas.microsoft.com/office/powerpoint/2010/main" xmlns="" val="1445642125"/>
       </p:ext>
     </p:extLst>
   </p:cSld>
@@ -13699,7 +13211,7 @@
           <a:blip r:embed="rId3" cstate="print">
             <a:extLst>
               <a:ext uri="{28A0092B-C50C-407E-A947-70E740481C1C}">
-                <a14:useLocalDpi xmlns:a14="http://schemas.microsoft.com/office/drawing/2010/main" val="0"/>
+                <a14:useLocalDpi xmlns:a14="http://schemas.microsoft.com/office/drawing/2010/main" xmlns="" val="0"/>
               </a:ext>
             </a:extLst>
           </a:blip>
@@ -13723,14 +13235,14 @@
           <a:effectLst/>
           <a:extLst>
             <a:ext uri="{909E8E84-426E-40DD-AFC4-6F175D3DCCD1}">
-              <a14:hiddenFill xmlns:a14="http://schemas.microsoft.com/office/drawing/2010/main">
+              <a14:hiddenFill xmlns:a14="http://schemas.microsoft.com/office/drawing/2010/main" xmlns="">
                 <a:solidFill>
                   <a:schemeClr val="accent1"/>
                 </a:solidFill>
               </a14:hiddenFill>
             </a:ext>
             <a:ext uri="{91240B29-F687-4F45-9708-019B960494DF}">
-              <a14:hiddenLine xmlns:a14="http://schemas.microsoft.com/office/drawing/2010/main" w="9525">
+              <a14:hiddenLine xmlns:a14="http://schemas.microsoft.com/office/drawing/2010/main" xmlns="" w="9525">
                 <a:solidFill>
                   <a:schemeClr val="tx1"/>
                 </a:solidFill>
@@ -13740,7 +13252,7 @@
               </a14:hiddenLine>
             </a:ext>
             <a:ext uri="{AF507438-7753-43E0-B8FC-AC1667EBCBE1}">
-              <a14:hiddenEffects xmlns:a14="http://schemas.microsoft.com/office/drawing/2010/main">
+              <a14:hiddenEffects xmlns:a14="http://schemas.microsoft.com/office/drawing/2010/main" xmlns="">
                 <a:effectLst>
                   <a:outerShdw dist="35921" dir="2700000" algn="ctr" rotWithShape="0">
                     <a:schemeClr val="bg2"/>
@@ -13754,7 +13266,7 @@
     </p:spTree>
     <p:extLst>
       <p:ext uri="{BB962C8B-B14F-4D97-AF65-F5344CB8AC3E}">
-        <p14:creationId xmlns:p14="http://schemas.microsoft.com/office/powerpoint/2010/main" val="1235334137"/>
+        <p14:creationId xmlns:p14="http://schemas.microsoft.com/office/powerpoint/2010/main" xmlns="" val="1235334137"/>
       </p:ext>
     </p:extLst>
   </p:cSld>
@@ -13908,7 +13420,7 @@
     </p:spTree>
     <p:extLst>
       <p:ext uri="{BB962C8B-B14F-4D97-AF65-F5344CB8AC3E}">
-        <p14:creationId xmlns:p14="http://schemas.microsoft.com/office/powerpoint/2010/main" val="2182676377"/>
+        <p14:creationId xmlns:p14="http://schemas.microsoft.com/office/powerpoint/2010/main" xmlns="" val="2182676377"/>
       </p:ext>
     </p:extLst>
   </p:cSld>
@@ -13993,16 +13505,12 @@
           <a:p>
             <a:pPr lvl="1"/>
             <a:r>
-              <a:rPr lang="en-US" sz="2400" dirty="0" smtClean="0">
-                <a:solidFill>
-                  <a:srgbClr val="FF0000"/>
-                </a:solidFill>
-              </a:rPr>
-              <a:t>NEED LINK HERE!!!</a:t>
-            </a:r>
-            <a:endParaRPr lang="en-US" sz="2400" dirty="0">
+              <a:rPr lang="en-US" sz="2400" dirty="0" smtClean="0"/>
+              <a:t>https://github.com/mlichtenberg/TDWG17</a:t>
+            </a:r>
+            <a:endParaRPr lang="en-US" sz="2400" dirty="0" smtClean="0">
               <a:solidFill>
-                <a:srgbClr val="FF0000"/>
+                <a:schemeClr val="tx1"/>
               </a:solidFill>
             </a:endParaRPr>
           </a:p>
@@ -14016,7 +13524,11 @@
             <a:pPr lvl="1"/>
             <a:r>
               <a:rPr lang="en-US" sz="2400" dirty="0" smtClean="0"/>
-              <a:t>https://biodivlib.wikispaces.com/Data+Exports</a:t>
+              <a:t>https</a:t>
+            </a:r>
+            <a:r>
+              <a:rPr lang="en-US" sz="2400" dirty="0" smtClean="0"/>
+              <a:t>://biodivlib.wikispaces.com/Data+Exports</a:t>
             </a:r>
           </a:p>
           <a:p>
@@ -14068,7 +13580,7 @@
           <a:blip r:embed="rId3" cstate="print">
             <a:extLst>
               <a:ext uri="{28A0092B-C50C-407E-A947-70E740481C1C}">
-                <a14:useLocalDpi xmlns:a14="http://schemas.microsoft.com/office/drawing/2010/main" val="0"/>
+                <a14:useLocalDpi xmlns:a14="http://schemas.microsoft.com/office/drawing/2010/main" xmlns="" val="0"/>
               </a:ext>
             </a:extLst>
           </a:blip>
@@ -14089,7 +13601,7 @@
     </p:spTree>
     <p:extLst>
       <p:ext uri="{BB962C8B-B14F-4D97-AF65-F5344CB8AC3E}">
-        <p14:creationId xmlns:p14="http://schemas.microsoft.com/office/powerpoint/2010/main" val="2109476903"/>
+        <p14:creationId xmlns:p14="http://schemas.microsoft.com/office/powerpoint/2010/main" xmlns="" val="2109476903"/>
       </p:ext>
     </p:extLst>
   </p:cSld>
@@ -14416,7 +13928,7 @@
           <a:blip r:embed="rId3" cstate="print">
             <a:extLst>
               <a:ext uri="{28A0092B-C50C-407E-A947-70E740481C1C}">
-                <a14:useLocalDpi xmlns:a14="http://schemas.microsoft.com/office/drawing/2010/main" val="0"/>
+                <a14:useLocalDpi xmlns:a14="http://schemas.microsoft.com/office/drawing/2010/main" xmlns="" val="0"/>
               </a:ext>
             </a:extLst>
           </a:blip>
@@ -14504,7 +14016,7 @@
     </p:spTree>
     <p:extLst>
       <p:ext uri="{BB962C8B-B14F-4D97-AF65-F5344CB8AC3E}">
-        <p14:creationId xmlns:p14="http://schemas.microsoft.com/office/powerpoint/2010/main" val="169160865"/>
+        <p14:creationId xmlns:p14="http://schemas.microsoft.com/office/powerpoint/2010/main" xmlns="" val="169160865"/>
       </p:ext>
     </p:extLst>
   </p:cSld>
@@ -14634,7 +14146,7 @@
           <a:blip r:embed="rId3" cstate="print">
             <a:extLst>
               <a:ext uri="{28A0092B-C50C-407E-A947-70E740481C1C}">
-                <a14:useLocalDpi xmlns:a14="http://schemas.microsoft.com/office/drawing/2010/main" val="0"/>
+                <a14:useLocalDpi xmlns:a14="http://schemas.microsoft.com/office/drawing/2010/main" xmlns="" val="0"/>
               </a:ext>
             </a:extLst>
           </a:blip>
@@ -14658,14 +14170,14 @@
           <a:effectLst/>
           <a:extLst>
             <a:ext uri="{909E8E84-426E-40DD-AFC4-6F175D3DCCD1}">
-              <a14:hiddenFill xmlns:a14="http://schemas.microsoft.com/office/drawing/2010/main">
+              <a14:hiddenFill xmlns:a14="http://schemas.microsoft.com/office/drawing/2010/main" xmlns="">
                 <a:solidFill>
                   <a:schemeClr val="accent1"/>
                 </a:solidFill>
               </a14:hiddenFill>
             </a:ext>
             <a:ext uri="{91240B29-F687-4F45-9708-019B960494DF}">
-              <a14:hiddenLine xmlns:a14="http://schemas.microsoft.com/office/drawing/2010/main" w="9525">
+              <a14:hiddenLine xmlns:a14="http://schemas.microsoft.com/office/drawing/2010/main" xmlns="" w="9525">
                 <a:solidFill>
                   <a:schemeClr val="tx1"/>
                 </a:solidFill>
@@ -14675,7 +14187,7 @@
               </a14:hiddenLine>
             </a:ext>
             <a:ext uri="{AF507438-7753-43E0-B8FC-AC1667EBCBE1}">
-              <a14:hiddenEffects xmlns:a14="http://schemas.microsoft.com/office/drawing/2010/main">
+              <a14:hiddenEffects xmlns:a14="http://schemas.microsoft.com/office/drawing/2010/main" xmlns="">
                 <a:effectLst>
                   <a:outerShdw dist="35921" dir="2700000" algn="ctr" rotWithShape="0">
                     <a:schemeClr val="bg2"/>
@@ -14689,7 +14201,7 @@
     </p:spTree>
     <p:extLst>
       <p:ext uri="{BB962C8B-B14F-4D97-AF65-F5344CB8AC3E}">
-        <p14:creationId xmlns:p14="http://schemas.microsoft.com/office/powerpoint/2010/main" val="1463292228"/>
+        <p14:creationId xmlns:p14="http://schemas.microsoft.com/office/powerpoint/2010/main" xmlns="" val="1463292228"/>
       </p:ext>
     </p:extLst>
   </p:cSld>
@@ -14962,7 +14474,7 @@
     </p:spTree>
     <p:extLst>
       <p:ext uri="{BB962C8B-B14F-4D97-AF65-F5344CB8AC3E}">
-        <p14:creationId xmlns:p14="http://schemas.microsoft.com/office/powerpoint/2010/main" val="1530659656"/>
+        <p14:creationId xmlns:p14="http://schemas.microsoft.com/office/powerpoint/2010/main" xmlns="" val="1530659656"/>
       </p:ext>
     </p:extLst>
   </p:cSld>
@@ -15120,7 +14632,7 @@
     </p:spTree>
     <p:extLst>
       <p:ext uri="{BB962C8B-B14F-4D97-AF65-F5344CB8AC3E}">
-        <p14:creationId xmlns:p14="http://schemas.microsoft.com/office/powerpoint/2010/main" val="3624246759"/>
+        <p14:creationId xmlns:p14="http://schemas.microsoft.com/office/powerpoint/2010/main" xmlns="" val="3624246759"/>
       </p:ext>
     </p:extLst>
   </p:cSld>
@@ -15298,7 +14810,7 @@
     </p:spTree>
     <p:extLst>
       <p:ext uri="{BB962C8B-B14F-4D97-AF65-F5344CB8AC3E}">
-        <p14:creationId xmlns:p14="http://schemas.microsoft.com/office/powerpoint/2010/main" val="128529910"/>
+        <p14:creationId xmlns:p14="http://schemas.microsoft.com/office/powerpoint/2010/main" xmlns="" val="128529910"/>
       </p:ext>
     </p:extLst>
   </p:cSld>
@@ -15688,7 +15200,7 @@
           <a:blip r:embed="rId3" cstate="print">
             <a:extLst>
               <a:ext uri="{28A0092B-C50C-407E-A947-70E740481C1C}">
-                <a14:useLocalDpi xmlns:a14="http://schemas.microsoft.com/office/drawing/2010/main" val="0"/>
+                <a14:useLocalDpi xmlns:a14="http://schemas.microsoft.com/office/drawing/2010/main" xmlns="" val="0"/>
               </a:ext>
             </a:extLst>
           </a:blip>
@@ -15712,14 +15224,14 @@
           <a:effectLst/>
           <a:extLst>
             <a:ext uri="{909E8E84-426E-40DD-AFC4-6F175D3DCCD1}">
-              <a14:hiddenFill xmlns:a14="http://schemas.microsoft.com/office/drawing/2010/main">
+              <a14:hiddenFill xmlns:a14="http://schemas.microsoft.com/office/drawing/2010/main" xmlns="">
                 <a:solidFill>
                   <a:schemeClr val="accent1"/>
                 </a:solidFill>
               </a14:hiddenFill>
             </a:ext>
             <a:ext uri="{91240B29-F687-4F45-9708-019B960494DF}">
-              <a14:hiddenLine xmlns:a14="http://schemas.microsoft.com/office/drawing/2010/main" w="9525">
+              <a14:hiddenLine xmlns:a14="http://schemas.microsoft.com/office/drawing/2010/main" xmlns="" w="9525">
                 <a:solidFill>
                   <a:schemeClr val="tx1"/>
                 </a:solidFill>
@@ -15729,7 +15241,7 @@
               </a14:hiddenLine>
             </a:ext>
             <a:ext uri="{AF507438-7753-43E0-B8FC-AC1667EBCBE1}">
-              <a14:hiddenEffects xmlns:a14="http://schemas.microsoft.com/office/drawing/2010/main">
+              <a14:hiddenEffects xmlns:a14="http://schemas.microsoft.com/office/drawing/2010/main" xmlns="">
                 <a:effectLst>
                   <a:outerShdw dist="35921" dir="2700000" algn="ctr" rotWithShape="0">
                     <a:schemeClr val="bg2"/>
@@ -15743,7 +15255,7 @@
     </p:spTree>
     <p:extLst>
       <p:ext uri="{BB962C8B-B14F-4D97-AF65-F5344CB8AC3E}">
-        <p14:creationId xmlns:p14="http://schemas.microsoft.com/office/powerpoint/2010/main" val="1749797692"/>
+        <p14:creationId xmlns:p14="http://schemas.microsoft.com/office/powerpoint/2010/main" xmlns="" val="1749797692"/>
       </p:ext>
     </p:extLst>
   </p:cSld>
@@ -15842,7 +15354,6 @@
               <a:rPr lang="en-US" sz="2800" dirty="0" smtClean="0"/>
               <a:t>Pagination data</a:t>
             </a:r>
-            <a:endParaRPr lang="en-US" sz="2800" dirty="0" smtClean="0"/>
           </a:p>
           <a:p>
             <a:r>
@@ -15881,14 +15392,13 @@
               <a:rPr lang="en-US" sz="2800" dirty="0" smtClean="0"/>
               <a:t>)</a:t>
             </a:r>
-            <a:endParaRPr lang="en-US" sz="2800" dirty="0" smtClean="0"/>
           </a:p>
         </p:txBody>
       </p:sp>
     </p:spTree>
     <p:extLst>
       <p:ext uri="{BB962C8B-B14F-4D97-AF65-F5344CB8AC3E}">
-        <p14:creationId xmlns:p14="http://schemas.microsoft.com/office/powerpoint/2010/main" val="3082562895"/>
+        <p14:creationId xmlns:p14="http://schemas.microsoft.com/office/powerpoint/2010/main" xmlns="" val="3082562895"/>
       </p:ext>
     </p:extLst>
   </p:cSld>
@@ -16037,7 +15547,7 @@
     </p:spTree>
     <p:extLst>
       <p:ext uri="{BB962C8B-B14F-4D97-AF65-F5344CB8AC3E}">
-        <p14:creationId xmlns:p14="http://schemas.microsoft.com/office/powerpoint/2010/main" val="3972295608"/>
+        <p14:creationId xmlns:p14="http://schemas.microsoft.com/office/powerpoint/2010/main" xmlns="" val="3972295608"/>
       </p:ext>
     </p:extLst>
   </p:cSld>
@@ -16168,7 +15678,7 @@
     </p:spTree>
     <p:extLst>
       <p:ext uri="{BB962C8B-B14F-4D97-AF65-F5344CB8AC3E}">
-        <p14:creationId xmlns:p14="http://schemas.microsoft.com/office/powerpoint/2010/main" val="819861494"/>
+        <p14:creationId xmlns:p14="http://schemas.microsoft.com/office/powerpoint/2010/main" xmlns="" val="819861494"/>
       </p:ext>
     </p:extLst>
   </p:cSld>
@@ -16300,7 +15810,7 @@
           <a:blip r:embed="rId3" cstate="print">
             <a:extLst>
               <a:ext uri="{28A0092B-C50C-407E-A947-70E740481C1C}">
-                <a14:useLocalDpi xmlns:a14="http://schemas.microsoft.com/office/drawing/2010/main" val="0"/>
+                <a14:useLocalDpi xmlns:a14="http://schemas.microsoft.com/office/drawing/2010/main" xmlns="" val="0"/>
               </a:ext>
             </a:extLst>
           </a:blip>
@@ -16324,14 +15834,14 @@
           <a:effectLst/>
           <a:extLst>
             <a:ext uri="{909E8E84-426E-40DD-AFC4-6F175D3DCCD1}">
-              <a14:hiddenFill xmlns:a14="http://schemas.microsoft.com/office/drawing/2010/main">
+              <a14:hiddenFill xmlns:a14="http://schemas.microsoft.com/office/drawing/2010/main" xmlns="">
                 <a:solidFill>
                   <a:schemeClr val="accent1"/>
                 </a:solidFill>
               </a14:hiddenFill>
             </a:ext>
             <a:ext uri="{91240B29-F687-4F45-9708-019B960494DF}">
-              <a14:hiddenLine xmlns:a14="http://schemas.microsoft.com/office/drawing/2010/main" w="9525">
+              <a14:hiddenLine xmlns:a14="http://schemas.microsoft.com/office/drawing/2010/main" xmlns="" w="9525">
                 <a:solidFill>
                   <a:schemeClr val="tx1"/>
                 </a:solidFill>
@@ -16341,7 +15851,7 @@
               </a14:hiddenLine>
             </a:ext>
             <a:ext uri="{AF507438-7753-43E0-B8FC-AC1667EBCBE1}">
-              <a14:hiddenEffects xmlns:a14="http://schemas.microsoft.com/office/drawing/2010/main">
+              <a14:hiddenEffects xmlns:a14="http://schemas.microsoft.com/office/drawing/2010/main" xmlns="">
                 <a:effectLst>
                   <a:outerShdw dist="35921" dir="2700000" algn="ctr" rotWithShape="0">
                     <a:schemeClr val="bg2"/>
@@ -16355,7 +15865,7 @@
     </p:spTree>
     <p:extLst>
       <p:ext uri="{BB962C8B-B14F-4D97-AF65-F5344CB8AC3E}">
-        <p14:creationId xmlns:p14="http://schemas.microsoft.com/office/powerpoint/2010/main" val="343431817"/>
+        <p14:creationId xmlns:p14="http://schemas.microsoft.com/office/powerpoint/2010/main" xmlns="" val="343431817"/>
       </p:ext>
     </p:extLst>
   </p:cSld>
@@ -16508,13 +16018,8 @@
           <a:p>
             <a:r>
               <a:rPr lang="en-US" sz="2800" dirty="0" smtClean="0"/>
-              <a:t>http</a:t>
-            </a:r>
-            <a:r>
-              <a:rPr lang="en-US" sz="2800" dirty="0" smtClean="0"/>
-              <a:t>://biodiversitylibrary.org/data</a:t>
-            </a:r>
-            <a:endParaRPr lang="en-US" sz="2800" dirty="0" smtClean="0"/>
+              <a:t>http://biodiversitylibrary.org/data</a:t>
+            </a:r>
           </a:p>
           <a:p>
             <a:pPr>
@@ -16535,7 +16040,7 @@
     </p:spTree>
     <p:extLst>
       <p:ext uri="{BB962C8B-B14F-4D97-AF65-F5344CB8AC3E}">
-        <p14:creationId xmlns:p14="http://schemas.microsoft.com/office/powerpoint/2010/main" val="4195191575"/>
+        <p14:creationId xmlns:p14="http://schemas.microsoft.com/office/powerpoint/2010/main" xmlns="" val="4195191575"/>
       </p:ext>
     </p:extLst>
   </p:cSld>

</xml_diff>

<commit_message>
Updated http BHL links to be https
</commit_message>
<xml_diff>
--- a/BallroomA_Wednesday_1100_Lichtenberg/BallroomA_Wednesday_1100_Lichtenberg.pptx
+++ b/BallroomA_Wednesday_1100_Lichtenberg/BallroomA_Wednesday_1100_Lichtenberg.pptx
@@ -134,7 +134,7 @@
   </p:defaultTextStyle>
   <p:extLst>
     <p:ext uri="{EFAFB233-063F-42B5-8137-9DF3F51BA10A}">
-      <p15:sldGuideLst xmlns="" xmlns:p15="http://schemas.microsoft.com/office/powerpoint/2012/main">
+      <p15:sldGuideLst xmlns:p15="http://schemas.microsoft.com/office/powerpoint/2012/main" xmlns="">
         <p15:guide id="1" orient="horz" pos="2160">
           <p15:clr>
             <a:srgbClr val="A4A3A4"/>
@@ -234,7 +234,7 @@
             <a:fld id="{A4076B97-77BE-4089-B3C3-FDBC79649A58}" type="datetimeFigureOut">
               <a:rPr lang="en-US" smtClean="0"/>
               <a:pPr/>
-              <a:t>10/1/2017</a:t>
+              <a:t>10/2/2017</a:t>
             </a:fld>
             <a:endParaRPr lang="en-US"/>
           </a:p>
@@ -310,7 +310,7 @@
     </p:spTree>
     <p:extLst>
       <p:ext uri="{BB962C8B-B14F-4D97-AF65-F5344CB8AC3E}">
-        <p14:creationId xmlns:p14="http://schemas.microsoft.com/office/powerpoint/2010/main" xmlns="" val="1542679036"/>
+        <p14:creationId xmlns="" xmlns:p14="http://schemas.microsoft.com/office/powerpoint/2010/main" val="1542679036"/>
       </p:ext>
     </p:extLst>
   </p:cSld>
@@ -401,7 +401,7 @@
             <a:fld id="{0F20EE3F-066A-464D-B097-D1A3B5F04D50}" type="datetimeFigureOut">
               <a:rPr lang="en-US" smtClean="0"/>
               <a:pPr/>
-              <a:t>10/1/2017</a:t>
+              <a:t>10/2/2017</a:t>
             </a:fld>
             <a:endParaRPr lang="en-US"/>
           </a:p>
@@ -570,7 +570,7 @@
     </p:spTree>
     <p:extLst>
       <p:ext uri="{BB962C8B-B14F-4D97-AF65-F5344CB8AC3E}">
-        <p14:creationId xmlns:p14="http://schemas.microsoft.com/office/powerpoint/2010/main" xmlns="" val="1465351002"/>
+        <p14:creationId xmlns="" xmlns:p14="http://schemas.microsoft.com/office/powerpoint/2010/main" val="1465351002"/>
       </p:ext>
     </p:extLst>
   </p:cSld>
@@ -769,7 +769,7 @@
     </p:spTree>
     <p:extLst>
       <p:ext uri="{BB962C8B-B14F-4D97-AF65-F5344CB8AC3E}">
-        <p14:creationId xmlns:p14="http://schemas.microsoft.com/office/powerpoint/2010/main" xmlns="" val="4098884712"/>
+        <p14:creationId xmlns="" xmlns:p14="http://schemas.microsoft.com/office/powerpoint/2010/main" val="4098884712"/>
       </p:ext>
     </p:extLst>
   </p:cSld>
@@ -1087,7 +1087,7 @@
     </p:spTree>
     <p:extLst>
       <p:ext uri="{BB962C8B-B14F-4D97-AF65-F5344CB8AC3E}">
-        <p14:creationId xmlns:p14="http://schemas.microsoft.com/office/powerpoint/2010/main" xmlns="" val="1056626509"/>
+        <p14:creationId xmlns="" xmlns:p14="http://schemas.microsoft.com/office/powerpoint/2010/main" val="1056626509"/>
       </p:ext>
     </p:extLst>
   </p:cSld>
@@ -1283,7 +1283,7 @@
     </p:spTree>
     <p:extLst>
       <p:ext uri="{BB962C8B-B14F-4D97-AF65-F5344CB8AC3E}">
-        <p14:creationId xmlns:p14="http://schemas.microsoft.com/office/powerpoint/2010/main" xmlns="" val="186999312"/>
+        <p14:creationId xmlns="" xmlns:p14="http://schemas.microsoft.com/office/powerpoint/2010/main" val="186999312"/>
       </p:ext>
     </p:extLst>
   </p:cSld>
@@ -1398,7 +1398,7 @@
     </p:spTree>
     <p:extLst>
       <p:ext uri="{BB962C8B-B14F-4D97-AF65-F5344CB8AC3E}">
-        <p14:creationId xmlns:p14="http://schemas.microsoft.com/office/powerpoint/2010/main" xmlns="" val="1984052621"/>
+        <p14:creationId xmlns="" xmlns:p14="http://schemas.microsoft.com/office/powerpoint/2010/main" val="1984052621"/>
       </p:ext>
     </p:extLst>
   </p:cSld>
@@ -1692,7 +1692,7 @@
     </p:spTree>
     <p:extLst>
       <p:ext uri="{BB962C8B-B14F-4D97-AF65-F5344CB8AC3E}">
-        <p14:creationId xmlns:p14="http://schemas.microsoft.com/office/powerpoint/2010/main" xmlns="" val="2255951382"/>
+        <p14:creationId xmlns="" xmlns:p14="http://schemas.microsoft.com/office/powerpoint/2010/main" val="2255951382"/>
       </p:ext>
     </p:extLst>
   </p:cSld>
@@ -1800,7 +1800,7 @@
     </p:spTree>
     <p:extLst>
       <p:ext uri="{BB962C8B-B14F-4D97-AF65-F5344CB8AC3E}">
-        <p14:creationId xmlns:p14="http://schemas.microsoft.com/office/powerpoint/2010/main" xmlns="" val="1368255976"/>
+        <p14:creationId xmlns="" xmlns:p14="http://schemas.microsoft.com/office/powerpoint/2010/main" val="1368255976"/>
       </p:ext>
     </p:extLst>
   </p:cSld>
@@ -1913,7 +1913,7 @@
     </p:spTree>
     <p:extLst>
       <p:ext uri="{BB962C8B-B14F-4D97-AF65-F5344CB8AC3E}">
-        <p14:creationId xmlns:p14="http://schemas.microsoft.com/office/powerpoint/2010/main" xmlns="" val="3091952112"/>
+        <p14:creationId xmlns="" xmlns:p14="http://schemas.microsoft.com/office/powerpoint/2010/main" val="3091952112"/>
       </p:ext>
     </p:extLst>
   </p:cSld>
@@ -2056,7 +2056,7 @@
     </p:spTree>
     <p:extLst>
       <p:ext uri="{BB962C8B-B14F-4D97-AF65-F5344CB8AC3E}">
-        <p14:creationId xmlns:p14="http://schemas.microsoft.com/office/powerpoint/2010/main" xmlns="" val="1420271675"/>
+        <p14:creationId xmlns="" xmlns:p14="http://schemas.microsoft.com/office/powerpoint/2010/main" val="1420271675"/>
       </p:ext>
     </p:extLst>
   </p:cSld>
@@ -2348,7 +2348,7 @@
     </p:spTree>
     <p:extLst>
       <p:ext uri="{BB962C8B-B14F-4D97-AF65-F5344CB8AC3E}">
-        <p14:creationId xmlns:p14="http://schemas.microsoft.com/office/powerpoint/2010/main" xmlns="" val="519396750"/>
+        <p14:creationId xmlns="" xmlns:p14="http://schemas.microsoft.com/office/powerpoint/2010/main" val="519396750"/>
       </p:ext>
     </p:extLst>
   </p:cSld>
@@ -2461,7 +2461,7 @@
     </p:spTree>
     <p:extLst>
       <p:ext uri="{BB962C8B-B14F-4D97-AF65-F5344CB8AC3E}">
-        <p14:creationId xmlns:p14="http://schemas.microsoft.com/office/powerpoint/2010/main" xmlns="" val="2492857078"/>
+        <p14:creationId xmlns="" xmlns:p14="http://schemas.microsoft.com/office/powerpoint/2010/main" val="2492857078"/>
       </p:ext>
     </p:extLst>
   </p:cSld>
@@ -2581,7 +2581,7 @@
     </p:spTree>
     <p:extLst>
       <p:ext uri="{BB962C8B-B14F-4D97-AF65-F5344CB8AC3E}">
-        <p14:creationId xmlns:p14="http://schemas.microsoft.com/office/powerpoint/2010/main" xmlns="" val="3161249615"/>
+        <p14:creationId xmlns="" xmlns:p14="http://schemas.microsoft.com/office/powerpoint/2010/main" val="3161249615"/>
       </p:ext>
     </p:extLst>
   </p:cSld>
@@ -2938,7 +2938,7 @@
     </p:spTree>
     <p:extLst>
       <p:ext uri="{BB962C8B-B14F-4D97-AF65-F5344CB8AC3E}">
-        <p14:creationId xmlns:p14="http://schemas.microsoft.com/office/powerpoint/2010/main" xmlns="" val="2163336662"/>
+        <p14:creationId xmlns="" xmlns:p14="http://schemas.microsoft.com/office/powerpoint/2010/main" val="2163336662"/>
       </p:ext>
     </p:extLst>
   </p:cSld>
@@ -3111,7 +3111,7 @@
     </p:spTree>
     <p:extLst>
       <p:ext uri="{BB962C8B-B14F-4D97-AF65-F5344CB8AC3E}">
-        <p14:creationId xmlns:p14="http://schemas.microsoft.com/office/powerpoint/2010/main" xmlns="" val="1254822975"/>
+        <p14:creationId xmlns="" xmlns:p14="http://schemas.microsoft.com/office/powerpoint/2010/main" val="1254822975"/>
       </p:ext>
     </p:extLst>
   </p:cSld>
@@ -3245,7 +3245,7 @@
     </p:spTree>
     <p:extLst>
       <p:ext uri="{BB962C8B-B14F-4D97-AF65-F5344CB8AC3E}">
-        <p14:creationId xmlns:p14="http://schemas.microsoft.com/office/powerpoint/2010/main" xmlns="" val="3860997776"/>
+        <p14:creationId xmlns="" xmlns:p14="http://schemas.microsoft.com/office/powerpoint/2010/main" val="3860997776"/>
       </p:ext>
     </p:extLst>
   </p:cSld>
@@ -3654,7 +3654,7 @@
     </p:spTree>
     <p:extLst>
       <p:ext uri="{BB962C8B-B14F-4D97-AF65-F5344CB8AC3E}">
-        <p14:creationId xmlns:p14="http://schemas.microsoft.com/office/powerpoint/2010/main" xmlns="" val="881293455"/>
+        <p14:creationId xmlns="" xmlns:p14="http://schemas.microsoft.com/office/powerpoint/2010/main" val="881293455"/>
       </p:ext>
     </p:extLst>
   </p:cSld>
@@ -4325,7 +4325,7 @@
     </p:spTree>
     <p:extLst>
       <p:ext uri="{BB962C8B-B14F-4D97-AF65-F5344CB8AC3E}">
-        <p14:creationId xmlns:p14="http://schemas.microsoft.com/office/powerpoint/2010/main" xmlns="" val="2796509056"/>
+        <p14:creationId xmlns="" xmlns:p14="http://schemas.microsoft.com/office/powerpoint/2010/main" val="2796509056"/>
       </p:ext>
     </p:extLst>
   </p:cSld>
@@ -4471,7 +4471,7 @@
     </p:spTree>
     <p:extLst>
       <p:ext uri="{BB962C8B-B14F-4D97-AF65-F5344CB8AC3E}">
-        <p14:creationId xmlns:p14="http://schemas.microsoft.com/office/powerpoint/2010/main" xmlns="" val="3924599026"/>
+        <p14:creationId xmlns="" xmlns:p14="http://schemas.microsoft.com/office/powerpoint/2010/main" val="3924599026"/>
       </p:ext>
     </p:extLst>
   </p:cSld>
@@ -4627,7 +4627,7 @@
     </p:spTree>
     <p:extLst>
       <p:ext uri="{BB962C8B-B14F-4D97-AF65-F5344CB8AC3E}">
-        <p14:creationId xmlns:p14="http://schemas.microsoft.com/office/powerpoint/2010/main" xmlns="" val="1591452945"/>
+        <p14:creationId xmlns="" xmlns:p14="http://schemas.microsoft.com/office/powerpoint/2010/main" val="1591452945"/>
       </p:ext>
     </p:extLst>
   </p:cSld>
@@ -4858,7 +4858,7 @@
     </p:spTree>
     <p:extLst>
       <p:ext uri="{BB962C8B-B14F-4D97-AF65-F5344CB8AC3E}">
-        <p14:creationId xmlns:p14="http://schemas.microsoft.com/office/powerpoint/2010/main" xmlns="" val="1659397798"/>
+        <p14:creationId xmlns="" xmlns:p14="http://schemas.microsoft.com/office/powerpoint/2010/main" val="1659397798"/>
       </p:ext>
     </p:extLst>
   </p:cSld>
@@ -4980,7 +4980,7 @@
     </p:spTree>
     <p:extLst>
       <p:ext uri="{BB962C8B-B14F-4D97-AF65-F5344CB8AC3E}">
-        <p14:creationId xmlns:p14="http://schemas.microsoft.com/office/powerpoint/2010/main" xmlns="" val="1195562963"/>
+        <p14:creationId xmlns="" xmlns:p14="http://schemas.microsoft.com/office/powerpoint/2010/main" val="1195562963"/>
       </p:ext>
     </p:extLst>
   </p:cSld>
@@ -5133,7 +5133,7 @@
     </p:spTree>
     <p:extLst>
       <p:ext uri="{BB962C8B-B14F-4D97-AF65-F5344CB8AC3E}">
-        <p14:creationId xmlns:p14="http://schemas.microsoft.com/office/powerpoint/2010/main" xmlns="" val="97680472"/>
+        <p14:creationId xmlns="" xmlns:p14="http://schemas.microsoft.com/office/powerpoint/2010/main" val="97680472"/>
       </p:ext>
     </p:extLst>
   </p:cSld>
@@ -5405,7 +5405,7 @@
     </p:spTree>
     <p:extLst>
       <p:ext uri="{BB962C8B-B14F-4D97-AF65-F5344CB8AC3E}">
-        <p14:creationId xmlns:p14="http://schemas.microsoft.com/office/powerpoint/2010/main" xmlns="" val="1462193928"/>
+        <p14:creationId xmlns="" xmlns:p14="http://schemas.microsoft.com/office/powerpoint/2010/main" val="1462193928"/>
       </p:ext>
     </p:extLst>
   </p:cSld>
@@ -5444,7 +5444,7 @@
           <a:blip r:embed="rId2" cstate="print">
             <a:extLst>
               <a:ext uri="{28A0092B-C50C-407E-A947-70E740481C1C}">
-                <a14:useLocalDpi xmlns:a14="http://schemas.microsoft.com/office/drawing/2010/main" xmlns="" val="0"/>
+                <a14:useLocalDpi xmlns="" xmlns:a14="http://schemas.microsoft.com/office/drawing/2010/main" val="0"/>
               </a:ext>
             </a:extLst>
           </a:blip>
@@ -5468,14 +5468,14 @@
           <a:effectLst/>
           <a:extLst>
             <a:ext uri="{909E8E84-426E-40DD-AFC4-6F175D3DCCD1}">
-              <a14:hiddenFill xmlns:a14="http://schemas.microsoft.com/office/drawing/2010/main" xmlns="">
+              <a14:hiddenFill xmlns="" xmlns:a14="http://schemas.microsoft.com/office/drawing/2010/main">
                 <a:solidFill>
                   <a:schemeClr val="accent1"/>
                 </a:solidFill>
               </a14:hiddenFill>
             </a:ext>
             <a:ext uri="{91240B29-F687-4F45-9708-019B960494DF}">
-              <a14:hiddenLine xmlns:a14="http://schemas.microsoft.com/office/drawing/2010/main" xmlns="" w="9525">
+              <a14:hiddenLine xmlns="" xmlns:a14="http://schemas.microsoft.com/office/drawing/2010/main" w="9525">
                 <a:solidFill>
                   <a:schemeClr val="tx1"/>
                 </a:solidFill>
@@ -5485,7 +5485,7 @@
               </a14:hiddenLine>
             </a:ext>
             <a:ext uri="{AF507438-7753-43E0-B8FC-AC1667EBCBE1}">
-              <a14:hiddenEffects xmlns:a14="http://schemas.microsoft.com/office/drawing/2010/main" xmlns="">
+              <a14:hiddenEffects xmlns="" xmlns:a14="http://schemas.microsoft.com/office/drawing/2010/main">
                 <a:effectLst>
                   <a:outerShdw dist="35921" dir="2700000" algn="ctr" rotWithShape="0">
                     <a:schemeClr val="bg2"/>
@@ -5508,7 +5508,7 @@
           <a:blip r:embed="rId3" cstate="print">
             <a:extLst>
               <a:ext uri="{28A0092B-C50C-407E-A947-70E740481C1C}">
-                <a14:useLocalDpi xmlns:a14="http://schemas.microsoft.com/office/drawing/2010/main" xmlns="" val="0"/>
+                <a14:useLocalDpi xmlns="" xmlns:a14="http://schemas.microsoft.com/office/drawing/2010/main" val="0"/>
               </a:ext>
             </a:extLst>
           </a:blip>
@@ -5599,7 +5599,7 @@
     </p:spTree>
     <p:extLst>
       <p:ext uri="{BB962C8B-B14F-4D97-AF65-F5344CB8AC3E}">
-        <p14:creationId xmlns:p14="http://schemas.microsoft.com/office/powerpoint/2010/main" xmlns="" val="2478967282"/>
+        <p14:creationId xmlns="" xmlns:p14="http://schemas.microsoft.com/office/powerpoint/2010/main" val="2478967282"/>
       </p:ext>
     </p:extLst>
   </p:cSld>
@@ -5684,7 +5684,7 @@
           <a:blip r:embed="rId2" cstate="print">
             <a:extLst>
               <a:ext uri="{28A0092B-C50C-407E-A947-70E740481C1C}">
-                <a14:useLocalDpi xmlns:a14="http://schemas.microsoft.com/office/drawing/2010/main" xmlns="" val="0"/>
+                <a14:useLocalDpi xmlns="" xmlns:a14="http://schemas.microsoft.com/office/drawing/2010/main" val="0"/>
               </a:ext>
             </a:extLst>
           </a:blip>
@@ -6038,7 +6038,7 @@
     </p:spTree>
     <p:extLst>
       <p:ext uri="{BB962C8B-B14F-4D97-AF65-F5344CB8AC3E}">
-        <p14:creationId xmlns:p14="http://schemas.microsoft.com/office/powerpoint/2010/main" xmlns="" val="1649327088"/>
+        <p14:creationId xmlns="" xmlns:p14="http://schemas.microsoft.com/office/powerpoint/2010/main" val="1649327088"/>
       </p:ext>
     </p:extLst>
   </p:cSld>
@@ -6463,7 +6463,7 @@
           <a:blip r:embed="rId2" cstate="print">
             <a:extLst>
               <a:ext uri="{28A0092B-C50C-407E-A947-70E740481C1C}">
-                <a14:useLocalDpi xmlns:a14="http://schemas.microsoft.com/office/drawing/2010/main" xmlns="" val="0"/>
+                <a14:useLocalDpi xmlns="" xmlns:a14="http://schemas.microsoft.com/office/drawing/2010/main" val="0"/>
               </a:ext>
             </a:extLst>
           </a:blip>
@@ -6527,7 +6527,7 @@
     </p:spTree>
     <p:extLst>
       <p:ext uri="{BB962C8B-B14F-4D97-AF65-F5344CB8AC3E}">
-        <p14:creationId xmlns:p14="http://schemas.microsoft.com/office/powerpoint/2010/main" xmlns="" val="1675475096"/>
+        <p14:creationId xmlns="" xmlns:p14="http://schemas.microsoft.com/office/powerpoint/2010/main" val="1675475096"/>
       </p:ext>
     </p:extLst>
   </p:cSld>
@@ -6612,7 +6612,7 @@
           <a:blip r:embed="rId2" cstate="print">
             <a:extLst>
               <a:ext uri="{28A0092B-C50C-407E-A947-70E740481C1C}">
-                <a14:useLocalDpi xmlns:a14="http://schemas.microsoft.com/office/drawing/2010/main" xmlns="" val="0"/>
+                <a14:useLocalDpi xmlns="" xmlns:a14="http://schemas.microsoft.com/office/drawing/2010/main" val="0"/>
               </a:ext>
             </a:extLst>
           </a:blip>
@@ -6676,7 +6676,7 @@
     </p:spTree>
     <p:extLst>
       <p:ext uri="{BB962C8B-B14F-4D97-AF65-F5344CB8AC3E}">
-        <p14:creationId xmlns:p14="http://schemas.microsoft.com/office/powerpoint/2010/main" xmlns="" val="3589482103"/>
+        <p14:creationId xmlns="" xmlns:p14="http://schemas.microsoft.com/office/powerpoint/2010/main" val="3589482103"/>
       </p:ext>
     </p:extLst>
   </p:cSld>
@@ -6779,7 +6779,7 @@
     </p:spTree>
     <p:extLst>
       <p:ext uri="{BB962C8B-B14F-4D97-AF65-F5344CB8AC3E}">
-        <p14:creationId xmlns:p14="http://schemas.microsoft.com/office/powerpoint/2010/main" xmlns="" val="3145854839"/>
+        <p14:creationId xmlns="" xmlns:p14="http://schemas.microsoft.com/office/powerpoint/2010/main" val="3145854839"/>
       </p:ext>
     </p:extLst>
   </p:cSld>
@@ -7015,7 +7015,7 @@
           <a:blip r:embed="rId2" cstate="print">
             <a:extLst>
               <a:ext uri="{28A0092B-C50C-407E-A947-70E740481C1C}">
-                <a14:useLocalDpi xmlns:a14="http://schemas.microsoft.com/office/drawing/2010/main" xmlns="" val="0"/>
+                <a14:useLocalDpi xmlns="" xmlns:a14="http://schemas.microsoft.com/office/drawing/2010/main" val="0"/>
               </a:ext>
             </a:extLst>
           </a:blip>
@@ -7082,7 +7082,7 @@
     </p:spTree>
     <p:extLst>
       <p:ext uri="{BB962C8B-B14F-4D97-AF65-F5344CB8AC3E}">
-        <p14:creationId xmlns:p14="http://schemas.microsoft.com/office/powerpoint/2010/main" xmlns="" val="2790897643"/>
+        <p14:creationId xmlns="" xmlns:p14="http://schemas.microsoft.com/office/powerpoint/2010/main" val="2790897643"/>
       </p:ext>
     </p:extLst>
   </p:cSld>
@@ -7167,7 +7167,7 @@
           <a:blip r:embed="rId2" cstate="print">
             <a:extLst>
               <a:ext uri="{28A0092B-C50C-407E-A947-70E740481C1C}">
-                <a14:useLocalDpi xmlns:a14="http://schemas.microsoft.com/office/drawing/2010/main" xmlns="" val="0"/>
+                <a14:useLocalDpi xmlns="" xmlns:a14="http://schemas.microsoft.com/office/drawing/2010/main" val="0"/>
               </a:ext>
             </a:extLst>
           </a:blip>
@@ -7231,7 +7231,7 @@
     </p:spTree>
     <p:extLst>
       <p:ext uri="{BB962C8B-B14F-4D97-AF65-F5344CB8AC3E}">
-        <p14:creationId xmlns:p14="http://schemas.microsoft.com/office/powerpoint/2010/main" xmlns="" val="2318148184"/>
+        <p14:creationId xmlns="" xmlns:p14="http://schemas.microsoft.com/office/powerpoint/2010/main" val="2318148184"/>
       </p:ext>
     </p:extLst>
   </p:cSld>
@@ -7316,7 +7316,7 @@
           <a:blip r:embed="rId2" cstate="print">
             <a:extLst>
               <a:ext uri="{28A0092B-C50C-407E-A947-70E740481C1C}">
-                <a14:useLocalDpi xmlns:a14="http://schemas.microsoft.com/office/drawing/2010/main" xmlns="" val="0"/>
+                <a14:useLocalDpi xmlns="" xmlns:a14="http://schemas.microsoft.com/office/drawing/2010/main" val="0"/>
               </a:ext>
             </a:extLst>
           </a:blip>
@@ -7380,7 +7380,7 @@
     </p:spTree>
     <p:extLst>
       <p:ext uri="{BB962C8B-B14F-4D97-AF65-F5344CB8AC3E}">
-        <p14:creationId xmlns:p14="http://schemas.microsoft.com/office/powerpoint/2010/main" xmlns="" val="20454123"/>
+        <p14:creationId xmlns="" xmlns:p14="http://schemas.microsoft.com/office/powerpoint/2010/main" val="20454123"/>
       </p:ext>
     </p:extLst>
   </p:cSld>
@@ -7465,7 +7465,7 @@
           <a:blip r:embed="rId2" cstate="print">
             <a:extLst>
               <a:ext uri="{28A0092B-C50C-407E-A947-70E740481C1C}">
-                <a14:useLocalDpi xmlns:a14="http://schemas.microsoft.com/office/drawing/2010/main" xmlns="" val="0"/>
+                <a14:useLocalDpi xmlns="" xmlns:a14="http://schemas.microsoft.com/office/drawing/2010/main" val="0"/>
               </a:ext>
             </a:extLst>
           </a:blip>
@@ -7529,7 +7529,7 @@
     </p:spTree>
     <p:extLst>
       <p:ext uri="{BB962C8B-B14F-4D97-AF65-F5344CB8AC3E}">
-        <p14:creationId xmlns:p14="http://schemas.microsoft.com/office/powerpoint/2010/main" xmlns="" val="20454123"/>
+        <p14:creationId xmlns="" xmlns:p14="http://schemas.microsoft.com/office/powerpoint/2010/main" val="20454123"/>
       </p:ext>
     </p:extLst>
   </p:cSld>
@@ -7614,7 +7614,7 @@
           <a:blip r:embed="rId2" cstate="print">
             <a:extLst>
               <a:ext uri="{28A0092B-C50C-407E-A947-70E740481C1C}">
-                <a14:useLocalDpi xmlns:a14="http://schemas.microsoft.com/office/drawing/2010/main" xmlns="" val="0"/>
+                <a14:useLocalDpi xmlns="" xmlns:a14="http://schemas.microsoft.com/office/drawing/2010/main" val="0"/>
               </a:ext>
             </a:extLst>
           </a:blip>
@@ -7678,7 +7678,7 @@
     </p:spTree>
     <p:extLst>
       <p:ext uri="{BB962C8B-B14F-4D97-AF65-F5344CB8AC3E}">
-        <p14:creationId xmlns:p14="http://schemas.microsoft.com/office/powerpoint/2010/main" xmlns="" val="20454123"/>
+        <p14:creationId xmlns="" xmlns:p14="http://schemas.microsoft.com/office/powerpoint/2010/main" val="20454123"/>
       </p:ext>
     </p:extLst>
   </p:cSld>
@@ -7763,7 +7763,7 @@
           <a:blip r:embed="rId2" cstate="print">
             <a:extLst>
               <a:ext uri="{28A0092B-C50C-407E-A947-70E740481C1C}">
-                <a14:useLocalDpi xmlns:a14="http://schemas.microsoft.com/office/drawing/2010/main" xmlns="" val="0"/>
+                <a14:useLocalDpi xmlns="" xmlns:a14="http://schemas.microsoft.com/office/drawing/2010/main" val="0"/>
               </a:ext>
             </a:extLst>
           </a:blip>
@@ -7827,7 +7827,7 @@
     </p:spTree>
     <p:extLst>
       <p:ext uri="{BB962C8B-B14F-4D97-AF65-F5344CB8AC3E}">
-        <p14:creationId xmlns:p14="http://schemas.microsoft.com/office/powerpoint/2010/main" xmlns="" val="20454123"/>
+        <p14:creationId xmlns="" xmlns:p14="http://schemas.microsoft.com/office/powerpoint/2010/main" val="20454123"/>
       </p:ext>
     </p:extLst>
   </p:cSld>
@@ -7866,7 +7866,7 @@
           <a:blip r:embed="rId2" cstate="print">
             <a:extLst>
               <a:ext uri="{28A0092B-C50C-407E-A947-70E740481C1C}">
-                <a14:useLocalDpi xmlns:a14="http://schemas.microsoft.com/office/drawing/2010/main" xmlns="" val="0"/>
+                <a14:useLocalDpi xmlns="" xmlns:a14="http://schemas.microsoft.com/office/drawing/2010/main" val="0"/>
               </a:ext>
             </a:extLst>
           </a:blip>
@@ -7890,14 +7890,14 @@
           <a:effectLst/>
           <a:extLst>
             <a:ext uri="{909E8E84-426E-40DD-AFC4-6F175D3DCCD1}">
-              <a14:hiddenFill xmlns:a14="http://schemas.microsoft.com/office/drawing/2010/main" xmlns="">
+              <a14:hiddenFill xmlns="" xmlns:a14="http://schemas.microsoft.com/office/drawing/2010/main">
                 <a:solidFill>
                   <a:schemeClr val="accent1"/>
                 </a:solidFill>
               </a14:hiddenFill>
             </a:ext>
             <a:ext uri="{91240B29-F687-4F45-9708-019B960494DF}">
-              <a14:hiddenLine xmlns:a14="http://schemas.microsoft.com/office/drawing/2010/main" xmlns="" w="9525">
+              <a14:hiddenLine xmlns="" xmlns:a14="http://schemas.microsoft.com/office/drawing/2010/main" w="9525">
                 <a:solidFill>
                   <a:schemeClr val="tx1"/>
                 </a:solidFill>
@@ -7907,7 +7907,7 @@
               </a14:hiddenLine>
             </a:ext>
             <a:ext uri="{AF507438-7753-43E0-B8FC-AC1667EBCBE1}">
-              <a14:hiddenEffects xmlns:a14="http://schemas.microsoft.com/office/drawing/2010/main" xmlns="">
+              <a14:hiddenEffects xmlns="" xmlns:a14="http://schemas.microsoft.com/office/drawing/2010/main">
                 <a:effectLst>
                   <a:outerShdw dist="35921" dir="2700000" algn="ctr" rotWithShape="0">
                     <a:schemeClr val="bg2"/>
@@ -7965,7 +7965,7 @@
           <a:blip r:embed="rId3" cstate="print">
             <a:extLst>
               <a:ext uri="{28A0092B-C50C-407E-A947-70E740481C1C}">
-                <a14:useLocalDpi xmlns:a14="http://schemas.microsoft.com/office/drawing/2010/main" xmlns="" val="0"/>
+                <a14:useLocalDpi xmlns="" xmlns:a14="http://schemas.microsoft.com/office/drawing/2010/main" val="0"/>
               </a:ext>
             </a:extLst>
           </a:blip>
@@ -7986,7 +7986,7 @@
     </p:spTree>
     <p:extLst>
       <p:ext uri="{BB962C8B-B14F-4D97-AF65-F5344CB8AC3E}">
-        <p14:creationId xmlns:p14="http://schemas.microsoft.com/office/powerpoint/2010/main" xmlns="" val="2678290118"/>
+        <p14:creationId xmlns="" xmlns:p14="http://schemas.microsoft.com/office/powerpoint/2010/main" val="2678290118"/>
       </p:ext>
     </p:extLst>
   </p:cSld>
@@ -8071,7 +8071,7 @@
           <a:blip r:embed="rId2" cstate="print">
             <a:extLst>
               <a:ext uri="{28A0092B-C50C-407E-A947-70E740481C1C}">
-                <a14:useLocalDpi xmlns:a14="http://schemas.microsoft.com/office/drawing/2010/main" xmlns="" val="0"/>
+                <a14:useLocalDpi xmlns="" xmlns:a14="http://schemas.microsoft.com/office/drawing/2010/main" val="0"/>
               </a:ext>
             </a:extLst>
           </a:blip>
@@ -8135,7 +8135,7 @@
     </p:spTree>
     <p:extLst>
       <p:ext uri="{BB962C8B-B14F-4D97-AF65-F5344CB8AC3E}">
-        <p14:creationId xmlns:p14="http://schemas.microsoft.com/office/powerpoint/2010/main" xmlns="" val="1664427782"/>
+        <p14:creationId xmlns="" xmlns:p14="http://schemas.microsoft.com/office/powerpoint/2010/main" val="1664427782"/>
       </p:ext>
     </p:extLst>
   </p:cSld>
@@ -8220,7 +8220,7 @@
           <a:blip r:embed="rId2" cstate="print">
             <a:extLst>
               <a:ext uri="{28A0092B-C50C-407E-A947-70E740481C1C}">
-                <a14:useLocalDpi xmlns:a14="http://schemas.microsoft.com/office/drawing/2010/main" xmlns="" val="0"/>
+                <a14:useLocalDpi xmlns="" xmlns:a14="http://schemas.microsoft.com/office/drawing/2010/main" val="0"/>
               </a:ext>
             </a:extLst>
           </a:blip>
@@ -8250,7 +8250,7 @@
           <a:blip r:embed="rId3" cstate="print">
             <a:extLst>
               <a:ext uri="{28A0092B-C50C-407E-A947-70E740481C1C}">
-                <a14:useLocalDpi xmlns:a14="http://schemas.microsoft.com/office/drawing/2010/main" xmlns="" val="0"/>
+                <a14:useLocalDpi xmlns="" xmlns:a14="http://schemas.microsoft.com/office/drawing/2010/main" val="0"/>
               </a:ext>
             </a:extLst>
           </a:blip>
@@ -8271,7 +8271,7 @@
     </p:spTree>
     <p:extLst>
       <p:ext uri="{BB962C8B-B14F-4D97-AF65-F5344CB8AC3E}">
-        <p14:creationId xmlns:p14="http://schemas.microsoft.com/office/powerpoint/2010/main" xmlns="" val="1430256493"/>
+        <p14:creationId xmlns="" xmlns:p14="http://schemas.microsoft.com/office/powerpoint/2010/main" val="1430256493"/>
       </p:ext>
     </p:extLst>
   </p:cSld>
@@ -8356,7 +8356,7 @@
           <a:blip r:embed="rId2" cstate="print">
             <a:extLst>
               <a:ext uri="{28A0092B-C50C-407E-A947-70E740481C1C}">
-                <a14:useLocalDpi xmlns:a14="http://schemas.microsoft.com/office/drawing/2010/main" xmlns="" val="0"/>
+                <a14:useLocalDpi xmlns="" xmlns:a14="http://schemas.microsoft.com/office/drawing/2010/main" val="0"/>
               </a:ext>
             </a:extLst>
           </a:blip>
@@ -8490,7 +8490,7 @@
     </p:spTree>
     <p:extLst>
       <p:ext uri="{BB962C8B-B14F-4D97-AF65-F5344CB8AC3E}">
-        <p14:creationId xmlns:p14="http://schemas.microsoft.com/office/powerpoint/2010/main" xmlns="" val="3135013638"/>
+        <p14:creationId xmlns="" xmlns:p14="http://schemas.microsoft.com/office/powerpoint/2010/main" val="3135013638"/>
       </p:ext>
     </p:extLst>
   </p:cSld>
@@ -8575,7 +8575,7 @@
           <a:blip r:embed="rId2" cstate="print">
             <a:extLst>
               <a:ext uri="{28A0092B-C50C-407E-A947-70E740481C1C}">
-                <a14:useLocalDpi xmlns:a14="http://schemas.microsoft.com/office/drawing/2010/main" xmlns="" val="0"/>
+                <a14:useLocalDpi xmlns="" xmlns:a14="http://schemas.microsoft.com/office/drawing/2010/main" val="0"/>
               </a:ext>
             </a:extLst>
           </a:blip>
@@ -8739,7 +8739,7 @@
     </p:spTree>
     <p:extLst>
       <p:ext uri="{BB962C8B-B14F-4D97-AF65-F5344CB8AC3E}">
-        <p14:creationId xmlns:p14="http://schemas.microsoft.com/office/powerpoint/2010/main" xmlns="" val="3072449041"/>
+        <p14:creationId xmlns="" xmlns:p14="http://schemas.microsoft.com/office/powerpoint/2010/main" val="3072449041"/>
       </p:ext>
     </p:extLst>
   </p:cSld>
@@ -8824,7 +8824,7 @@
           <a:blip r:embed="rId2" cstate="print">
             <a:extLst>
               <a:ext uri="{28A0092B-C50C-407E-A947-70E740481C1C}">
-                <a14:useLocalDpi xmlns:a14="http://schemas.microsoft.com/office/drawing/2010/main" xmlns="" val="0"/>
+                <a14:useLocalDpi xmlns="" xmlns:a14="http://schemas.microsoft.com/office/drawing/2010/main" val="0"/>
               </a:ext>
             </a:extLst>
           </a:blip>
@@ -8996,7 +8996,7 @@
     </p:spTree>
     <p:extLst>
       <p:ext uri="{BB962C8B-B14F-4D97-AF65-F5344CB8AC3E}">
-        <p14:creationId xmlns:p14="http://schemas.microsoft.com/office/powerpoint/2010/main" xmlns="" val="994759595"/>
+        <p14:creationId xmlns="" xmlns:p14="http://schemas.microsoft.com/office/powerpoint/2010/main" val="994759595"/>
       </p:ext>
     </p:extLst>
   </p:cSld>
@@ -9081,7 +9081,7 @@
           <a:blip r:embed="rId2" cstate="print">
             <a:extLst>
               <a:ext uri="{28A0092B-C50C-407E-A947-70E740481C1C}">
-                <a14:useLocalDpi xmlns:a14="http://schemas.microsoft.com/office/drawing/2010/main" xmlns="" val="0"/>
+                <a14:useLocalDpi xmlns="" xmlns:a14="http://schemas.microsoft.com/office/drawing/2010/main" val="0"/>
               </a:ext>
             </a:extLst>
           </a:blip>
@@ -9284,7 +9284,7 @@
     </p:spTree>
     <p:extLst>
       <p:ext uri="{BB962C8B-B14F-4D97-AF65-F5344CB8AC3E}">
-        <p14:creationId xmlns:p14="http://schemas.microsoft.com/office/powerpoint/2010/main" xmlns="" val="2174007619"/>
+        <p14:creationId xmlns="" xmlns:p14="http://schemas.microsoft.com/office/powerpoint/2010/main" val="2174007619"/>
       </p:ext>
     </p:extLst>
   </p:cSld>
@@ -9554,7 +9554,7 @@
           <a:blip r:embed="rId2" cstate="print">
             <a:extLst>
               <a:ext uri="{28A0092B-C50C-407E-A947-70E740481C1C}">
-                <a14:useLocalDpi xmlns:a14="http://schemas.microsoft.com/office/drawing/2010/main" xmlns="" val="0"/>
+                <a14:useLocalDpi xmlns="" xmlns:a14="http://schemas.microsoft.com/office/drawing/2010/main" val="0"/>
               </a:ext>
             </a:extLst>
           </a:blip>
@@ -9618,7 +9618,7 @@
     </p:spTree>
     <p:extLst>
       <p:ext uri="{BB962C8B-B14F-4D97-AF65-F5344CB8AC3E}">
-        <p14:creationId xmlns:p14="http://schemas.microsoft.com/office/powerpoint/2010/main" xmlns="" val="4189991210"/>
+        <p14:creationId xmlns="" xmlns:p14="http://schemas.microsoft.com/office/powerpoint/2010/main" val="4189991210"/>
       </p:ext>
     </p:extLst>
   </p:cSld>
@@ -9767,7 +9767,7 @@
           <a:blip r:embed="rId2" cstate="print">
             <a:extLst>
               <a:ext uri="{28A0092B-C50C-407E-A947-70E740481C1C}">
-                <a14:useLocalDpi xmlns:a14="http://schemas.microsoft.com/office/drawing/2010/main" xmlns="" val="0"/>
+                <a14:useLocalDpi xmlns="" xmlns:a14="http://schemas.microsoft.com/office/drawing/2010/main" val="0"/>
               </a:ext>
             </a:extLst>
           </a:blip>
@@ -9931,7 +9931,7 @@
     </p:spTree>
     <p:extLst>
       <p:ext uri="{BB962C8B-B14F-4D97-AF65-F5344CB8AC3E}">
-        <p14:creationId xmlns:p14="http://schemas.microsoft.com/office/powerpoint/2010/main" xmlns="" val="2761385501"/>
+        <p14:creationId xmlns="" xmlns:p14="http://schemas.microsoft.com/office/powerpoint/2010/main" val="2761385501"/>
       </p:ext>
     </p:extLst>
   </p:cSld>
@@ -10267,7 +10267,7 @@
     </p:spTree>
     <p:extLst>
       <p:ext uri="{BB962C8B-B14F-4D97-AF65-F5344CB8AC3E}">
-        <p14:creationId xmlns:p14="http://schemas.microsoft.com/office/powerpoint/2010/main" xmlns="" val="879668439"/>
+        <p14:creationId xmlns="" xmlns:p14="http://schemas.microsoft.com/office/powerpoint/2010/main" val="879668439"/>
       </p:ext>
     </p:extLst>
   </p:cSld>
@@ -10357,7 +10357,7 @@
           <a:blip r:embed="rId23" cstate="print">
             <a:extLst>
               <a:ext uri="{28A0092B-C50C-407E-A947-70E740481C1C}">
-                <a14:useLocalDpi xmlns:a14="http://schemas.microsoft.com/office/drawing/2010/main" xmlns="" val="0"/>
+                <a14:useLocalDpi xmlns="" xmlns:a14="http://schemas.microsoft.com/office/drawing/2010/main" val="0"/>
               </a:ext>
             </a:extLst>
           </a:blip>
@@ -10378,7 +10378,7 @@
     </p:spTree>
     <p:extLst>
       <p:ext uri="{BB962C8B-B14F-4D97-AF65-F5344CB8AC3E}">
-        <p14:creationId xmlns:p14="http://schemas.microsoft.com/office/powerpoint/2010/main" xmlns="" val="3044589780"/>
+        <p14:creationId xmlns="" xmlns:p14="http://schemas.microsoft.com/office/powerpoint/2010/main" val="3044589780"/>
       </p:ext>
     </p:extLst>
   </p:cSld>
@@ -11043,7 +11043,7 @@
     </p:spTree>
     <p:extLst>
       <p:ext uri="{BB962C8B-B14F-4D97-AF65-F5344CB8AC3E}">
-        <p14:creationId xmlns:p14="http://schemas.microsoft.com/office/powerpoint/2010/main" xmlns="" val="2337725177"/>
+        <p14:creationId xmlns="" xmlns:p14="http://schemas.microsoft.com/office/powerpoint/2010/main" val="2337725177"/>
       </p:ext>
     </p:extLst>
   </p:cSld>
@@ -11268,7 +11268,7 @@
     </p:spTree>
     <p:extLst>
       <p:ext uri="{BB962C8B-B14F-4D97-AF65-F5344CB8AC3E}">
-        <p14:creationId xmlns:p14="http://schemas.microsoft.com/office/powerpoint/2010/main" xmlns="" val="3507990499"/>
+        <p14:creationId xmlns="" xmlns:p14="http://schemas.microsoft.com/office/powerpoint/2010/main" val="3507990499"/>
       </p:ext>
     </p:extLst>
   </p:cSld>
@@ -11411,7 +11411,7 @@
     </p:spTree>
     <p:extLst>
       <p:ext uri="{BB962C8B-B14F-4D97-AF65-F5344CB8AC3E}">
-        <p14:creationId xmlns:p14="http://schemas.microsoft.com/office/powerpoint/2010/main" xmlns="" val="4021351983"/>
+        <p14:creationId xmlns="" xmlns:p14="http://schemas.microsoft.com/office/powerpoint/2010/main" val="4021351983"/>
       </p:ext>
     </p:extLst>
   </p:cSld>
@@ -11506,7 +11506,7 @@
     </p:spTree>
     <p:extLst>
       <p:ext uri="{BB962C8B-B14F-4D97-AF65-F5344CB8AC3E}">
-        <p14:creationId xmlns:p14="http://schemas.microsoft.com/office/powerpoint/2010/main" xmlns="" val="269176317"/>
+        <p14:creationId xmlns="" xmlns:p14="http://schemas.microsoft.com/office/powerpoint/2010/main" val="269176317"/>
       </p:ext>
     </p:extLst>
   </p:cSld>
@@ -11642,7 +11642,11 @@
             <a:pPr lvl="1"/>
             <a:r>
               <a:rPr lang="en-US" sz="2400" dirty="0" smtClean="0"/>
-              <a:t>http://biodiversitylibrary.org/getapikey.aspx</a:t>
+              <a:t>https://</a:t>
+            </a:r>
+            <a:r>
+              <a:rPr lang="en-US" sz="2400" dirty="0" smtClean="0"/>
+              <a:t>biodiversitylibrary.org/getapikey.aspx</a:t>
             </a:r>
           </a:p>
           <a:p>
@@ -11654,7 +11658,7 @@
     </p:spTree>
     <p:extLst>
       <p:ext uri="{BB962C8B-B14F-4D97-AF65-F5344CB8AC3E}">
-        <p14:creationId xmlns:p14="http://schemas.microsoft.com/office/powerpoint/2010/main" xmlns="" val="3617054278"/>
+        <p14:creationId xmlns="" xmlns:p14="http://schemas.microsoft.com/office/powerpoint/2010/main" val="3617054278"/>
       </p:ext>
     </p:extLst>
   </p:cSld>
@@ -11749,7 +11753,7 @@
     </p:spTree>
     <p:extLst>
       <p:ext uri="{BB962C8B-B14F-4D97-AF65-F5344CB8AC3E}">
-        <p14:creationId xmlns:p14="http://schemas.microsoft.com/office/powerpoint/2010/main" xmlns="" val="3057094392"/>
+        <p14:creationId xmlns="" xmlns:p14="http://schemas.microsoft.com/office/powerpoint/2010/main" val="3057094392"/>
       </p:ext>
     </p:extLst>
   </p:cSld>
@@ -13085,7 +13089,7 @@
     </p:spTree>
     <p:extLst>
       <p:ext uri="{BB962C8B-B14F-4D97-AF65-F5344CB8AC3E}">
-        <p14:creationId xmlns:p14="http://schemas.microsoft.com/office/powerpoint/2010/main" xmlns="" val="1445642125"/>
+        <p14:creationId xmlns="" xmlns:p14="http://schemas.microsoft.com/office/powerpoint/2010/main" val="1445642125"/>
       </p:ext>
     </p:extLst>
   </p:cSld>
@@ -13211,7 +13215,7 @@
           <a:blip r:embed="rId3" cstate="print">
             <a:extLst>
               <a:ext uri="{28A0092B-C50C-407E-A947-70E740481C1C}">
-                <a14:useLocalDpi xmlns:a14="http://schemas.microsoft.com/office/drawing/2010/main" xmlns="" val="0"/>
+                <a14:useLocalDpi xmlns="" xmlns:a14="http://schemas.microsoft.com/office/drawing/2010/main" val="0"/>
               </a:ext>
             </a:extLst>
           </a:blip>
@@ -13235,14 +13239,14 @@
           <a:effectLst/>
           <a:extLst>
             <a:ext uri="{909E8E84-426E-40DD-AFC4-6F175D3DCCD1}">
-              <a14:hiddenFill xmlns:a14="http://schemas.microsoft.com/office/drawing/2010/main" xmlns="">
+              <a14:hiddenFill xmlns="" xmlns:a14="http://schemas.microsoft.com/office/drawing/2010/main">
                 <a:solidFill>
                   <a:schemeClr val="accent1"/>
                 </a:solidFill>
               </a14:hiddenFill>
             </a:ext>
             <a:ext uri="{91240B29-F687-4F45-9708-019B960494DF}">
-              <a14:hiddenLine xmlns:a14="http://schemas.microsoft.com/office/drawing/2010/main" xmlns="" w="9525">
+              <a14:hiddenLine xmlns="" xmlns:a14="http://schemas.microsoft.com/office/drawing/2010/main" w="9525">
                 <a:solidFill>
                   <a:schemeClr val="tx1"/>
                 </a:solidFill>
@@ -13252,7 +13256,7 @@
               </a14:hiddenLine>
             </a:ext>
             <a:ext uri="{AF507438-7753-43E0-B8FC-AC1667EBCBE1}">
-              <a14:hiddenEffects xmlns:a14="http://schemas.microsoft.com/office/drawing/2010/main" xmlns="">
+              <a14:hiddenEffects xmlns="" xmlns:a14="http://schemas.microsoft.com/office/drawing/2010/main">
                 <a:effectLst>
                   <a:outerShdw dist="35921" dir="2700000" algn="ctr" rotWithShape="0">
                     <a:schemeClr val="bg2"/>
@@ -13266,7 +13270,7 @@
     </p:spTree>
     <p:extLst>
       <p:ext uri="{BB962C8B-B14F-4D97-AF65-F5344CB8AC3E}">
-        <p14:creationId xmlns:p14="http://schemas.microsoft.com/office/powerpoint/2010/main" xmlns="" val="1235334137"/>
+        <p14:creationId xmlns="" xmlns:p14="http://schemas.microsoft.com/office/powerpoint/2010/main" val="1235334137"/>
       </p:ext>
     </p:extLst>
   </p:cSld>
@@ -13420,7 +13424,7 @@
     </p:spTree>
     <p:extLst>
       <p:ext uri="{BB962C8B-B14F-4D97-AF65-F5344CB8AC3E}">
-        <p14:creationId xmlns:p14="http://schemas.microsoft.com/office/powerpoint/2010/main" xmlns="" val="2182676377"/>
+        <p14:creationId xmlns="" xmlns:p14="http://schemas.microsoft.com/office/powerpoint/2010/main" val="2182676377"/>
       </p:ext>
     </p:extLst>
   </p:cSld>
@@ -13524,11 +13528,7 @@
             <a:pPr lvl="1"/>
             <a:r>
               <a:rPr lang="en-US" sz="2400" dirty="0" smtClean="0"/>
-              <a:t>https</a:t>
-            </a:r>
-            <a:r>
-              <a:rPr lang="en-US" sz="2400" dirty="0" smtClean="0"/>
-              <a:t>://biodivlib.wikispaces.com/Data+Exports</a:t>
+              <a:t>https://biodivlib.wikispaces.com/Data+Exports</a:t>
             </a:r>
           </a:p>
           <a:p>
@@ -13542,7 +13542,11 @@
             <a:pPr lvl="1"/>
             <a:r>
               <a:rPr lang="en-US" sz="2400" dirty="0" smtClean="0"/>
-              <a:t>http://biodiversitylibrary.org/api2/docs/docs.html</a:t>
+              <a:t>https://</a:t>
+            </a:r>
+            <a:r>
+              <a:rPr lang="en-US" sz="2400" dirty="0" smtClean="0"/>
+              <a:t>biodiversitylibrary.org/api2/docs/docs.html</a:t>
             </a:r>
           </a:p>
           <a:p>
@@ -13580,7 +13584,7 @@
           <a:blip r:embed="rId3" cstate="print">
             <a:extLst>
               <a:ext uri="{28A0092B-C50C-407E-A947-70E740481C1C}">
-                <a14:useLocalDpi xmlns:a14="http://schemas.microsoft.com/office/drawing/2010/main" xmlns="" val="0"/>
+                <a14:useLocalDpi xmlns="" xmlns:a14="http://schemas.microsoft.com/office/drawing/2010/main" val="0"/>
               </a:ext>
             </a:extLst>
           </a:blip>
@@ -13601,7 +13605,7 @@
     </p:spTree>
     <p:extLst>
       <p:ext uri="{BB962C8B-B14F-4D97-AF65-F5344CB8AC3E}">
-        <p14:creationId xmlns:p14="http://schemas.microsoft.com/office/powerpoint/2010/main" xmlns="" val="2109476903"/>
+        <p14:creationId xmlns="" xmlns:p14="http://schemas.microsoft.com/office/powerpoint/2010/main" val="2109476903"/>
       </p:ext>
     </p:extLst>
   </p:cSld>
@@ -13928,7 +13932,7 @@
           <a:blip r:embed="rId3" cstate="print">
             <a:extLst>
               <a:ext uri="{28A0092B-C50C-407E-A947-70E740481C1C}">
-                <a14:useLocalDpi xmlns:a14="http://schemas.microsoft.com/office/drawing/2010/main" xmlns="" val="0"/>
+                <a14:useLocalDpi xmlns="" xmlns:a14="http://schemas.microsoft.com/office/drawing/2010/main" val="0"/>
               </a:ext>
             </a:extLst>
           </a:blip>
@@ -14016,7 +14020,7 @@
     </p:spTree>
     <p:extLst>
       <p:ext uri="{BB962C8B-B14F-4D97-AF65-F5344CB8AC3E}">
-        <p14:creationId xmlns:p14="http://schemas.microsoft.com/office/powerpoint/2010/main" xmlns="" val="169160865"/>
+        <p14:creationId xmlns="" xmlns:p14="http://schemas.microsoft.com/office/powerpoint/2010/main" val="169160865"/>
       </p:ext>
     </p:extLst>
   </p:cSld>
@@ -14146,7 +14150,7 @@
           <a:blip r:embed="rId3" cstate="print">
             <a:extLst>
               <a:ext uri="{28A0092B-C50C-407E-A947-70E740481C1C}">
-                <a14:useLocalDpi xmlns:a14="http://schemas.microsoft.com/office/drawing/2010/main" xmlns="" val="0"/>
+                <a14:useLocalDpi xmlns="" xmlns:a14="http://schemas.microsoft.com/office/drawing/2010/main" val="0"/>
               </a:ext>
             </a:extLst>
           </a:blip>
@@ -14170,14 +14174,14 @@
           <a:effectLst/>
           <a:extLst>
             <a:ext uri="{909E8E84-426E-40DD-AFC4-6F175D3DCCD1}">
-              <a14:hiddenFill xmlns:a14="http://schemas.microsoft.com/office/drawing/2010/main" xmlns="">
+              <a14:hiddenFill xmlns="" xmlns:a14="http://schemas.microsoft.com/office/drawing/2010/main">
                 <a:solidFill>
                   <a:schemeClr val="accent1"/>
                 </a:solidFill>
               </a14:hiddenFill>
             </a:ext>
             <a:ext uri="{91240B29-F687-4F45-9708-019B960494DF}">
-              <a14:hiddenLine xmlns:a14="http://schemas.microsoft.com/office/drawing/2010/main" xmlns="" w="9525">
+              <a14:hiddenLine xmlns="" xmlns:a14="http://schemas.microsoft.com/office/drawing/2010/main" w="9525">
                 <a:solidFill>
                   <a:schemeClr val="tx1"/>
                 </a:solidFill>
@@ -14187,7 +14191,7 @@
               </a14:hiddenLine>
             </a:ext>
             <a:ext uri="{AF507438-7753-43E0-B8FC-AC1667EBCBE1}">
-              <a14:hiddenEffects xmlns:a14="http://schemas.microsoft.com/office/drawing/2010/main" xmlns="">
+              <a14:hiddenEffects xmlns="" xmlns:a14="http://schemas.microsoft.com/office/drawing/2010/main">
                 <a:effectLst>
                   <a:outerShdw dist="35921" dir="2700000" algn="ctr" rotWithShape="0">
                     <a:schemeClr val="bg2"/>
@@ -14201,7 +14205,7 @@
     </p:spTree>
     <p:extLst>
       <p:ext uri="{BB962C8B-B14F-4D97-AF65-F5344CB8AC3E}">
-        <p14:creationId xmlns:p14="http://schemas.microsoft.com/office/powerpoint/2010/main" xmlns="" val="1463292228"/>
+        <p14:creationId xmlns="" xmlns:p14="http://schemas.microsoft.com/office/powerpoint/2010/main" val="1463292228"/>
       </p:ext>
     </p:extLst>
   </p:cSld>
@@ -14474,7 +14478,7 @@
     </p:spTree>
     <p:extLst>
       <p:ext uri="{BB962C8B-B14F-4D97-AF65-F5344CB8AC3E}">
-        <p14:creationId xmlns:p14="http://schemas.microsoft.com/office/powerpoint/2010/main" xmlns="" val="1530659656"/>
+        <p14:creationId xmlns="" xmlns:p14="http://schemas.microsoft.com/office/powerpoint/2010/main" val="1530659656"/>
       </p:ext>
     </p:extLst>
   </p:cSld>
@@ -14632,7 +14636,7 @@
     </p:spTree>
     <p:extLst>
       <p:ext uri="{BB962C8B-B14F-4D97-AF65-F5344CB8AC3E}">
-        <p14:creationId xmlns:p14="http://schemas.microsoft.com/office/powerpoint/2010/main" xmlns="" val="3624246759"/>
+        <p14:creationId xmlns="" xmlns:p14="http://schemas.microsoft.com/office/powerpoint/2010/main" val="3624246759"/>
       </p:ext>
     </p:extLst>
   </p:cSld>
@@ -14810,7 +14814,7 @@
     </p:spTree>
     <p:extLst>
       <p:ext uri="{BB962C8B-B14F-4D97-AF65-F5344CB8AC3E}">
-        <p14:creationId xmlns:p14="http://schemas.microsoft.com/office/powerpoint/2010/main" xmlns="" val="128529910"/>
+        <p14:creationId xmlns="" xmlns:p14="http://schemas.microsoft.com/office/powerpoint/2010/main" val="128529910"/>
       </p:ext>
     </p:extLst>
   </p:cSld>
@@ -15200,7 +15204,7 @@
           <a:blip r:embed="rId3" cstate="print">
             <a:extLst>
               <a:ext uri="{28A0092B-C50C-407E-A947-70E740481C1C}">
-                <a14:useLocalDpi xmlns:a14="http://schemas.microsoft.com/office/drawing/2010/main" xmlns="" val="0"/>
+                <a14:useLocalDpi xmlns="" xmlns:a14="http://schemas.microsoft.com/office/drawing/2010/main" val="0"/>
               </a:ext>
             </a:extLst>
           </a:blip>
@@ -15224,14 +15228,14 @@
           <a:effectLst/>
           <a:extLst>
             <a:ext uri="{909E8E84-426E-40DD-AFC4-6F175D3DCCD1}">
-              <a14:hiddenFill xmlns:a14="http://schemas.microsoft.com/office/drawing/2010/main" xmlns="">
+              <a14:hiddenFill xmlns="" xmlns:a14="http://schemas.microsoft.com/office/drawing/2010/main">
                 <a:solidFill>
                   <a:schemeClr val="accent1"/>
                 </a:solidFill>
               </a14:hiddenFill>
             </a:ext>
             <a:ext uri="{91240B29-F687-4F45-9708-019B960494DF}">
-              <a14:hiddenLine xmlns:a14="http://schemas.microsoft.com/office/drawing/2010/main" xmlns="" w="9525">
+              <a14:hiddenLine xmlns="" xmlns:a14="http://schemas.microsoft.com/office/drawing/2010/main" w="9525">
                 <a:solidFill>
                   <a:schemeClr val="tx1"/>
                 </a:solidFill>
@@ -15241,7 +15245,7 @@
               </a14:hiddenLine>
             </a:ext>
             <a:ext uri="{AF507438-7753-43E0-B8FC-AC1667EBCBE1}">
-              <a14:hiddenEffects xmlns:a14="http://schemas.microsoft.com/office/drawing/2010/main" xmlns="">
+              <a14:hiddenEffects xmlns="" xmlns:a14="http://schemas.microsoft.com/office/drawing/2010/main">
                 <a:effectLst>
                   <a:outerShdw dist="35921" dir="2700000" algn="ctr" rotWithShape="0">
                     <a:schemeClr val="bg2"/>
@@ -15255,7 +15259,7 @@
     </p:spTree>
     <p:extLst>
       <p:ext uri="{BB962C8B-B14F-4D97-AF65-F5344CB8AC3E}">
-        <p14:creationId xmlns:p14="http://schemas.microsoft.com/office/powerpoint/2010/main" xmlns="" val="1749797692"/>
+        <p14:creationId xmlns="" xmlns:p14="http://schemas.microsoft.com/office/powerpoint/2010/main" val="1749797692"/>
       </p:ext>
     </p:extLst>
   </p:cSld>
@@ -15398,7 +15402,7 @@
     </p:spTree>
     <p:extLst>
       <p:ext uri="{BB962C8B-B14F-4D97-AF65-F5344CB8AC3E}">
-        <p14:creationId xmlns:p14="http://schemas.microsoft.com/office/powerpoint/2010/main" xmlns="" val="3082562895"/>
+        <p14:creationId xmlns="" xmlns:p14="http://schemas.microsoft.com/office/powerpoint/2010/main" val="3082562895"/>
       </p:ext>
     </p:extLst>
   </p:cSld>
@@ -15547,7 +15551,7 @@
     </p:spTree>
     <p:extLst>
       <p:ext uri="{BB962C8B-B14F-4D97-AF65-F5344CB8AC3E}">
-        <p14:creationId xmlns:p14="http://schemas.microsoft.com/office/powerpoint/2010/main" xmlns="" val="3972295608"/>
+        <p14:creationId xmlns="" xmlns:p14="http://schemas.microsoft.com/office/powerpoint/2010/main" val="3972295608"/>
       </p:ext>
     </p:extLst>
   </p:cSld>
@@ -15678,7 +15682,7 @@
     </p:spTree>
     <p:extLst>
       <p:ext uri="{BB962C8B-B14F-4D97-AF65-F5344CB8AC3E}">
-        <p14:creationId xmlns:p14="http://schemas.microsoft.com/office/powerpoint/2010/main" xmlns="" val="819861494"/>
+        <p14:creationId xmlns="" xmlns:p14="http://schemas.microsoft.com/office/powerpoint/2010/main" val="819861494"/>
       </p:ext>
     </p:extLst>
   </p:cSld>
@@ -15810,7 +15814,7 @@
           <a:blip r:embed="rId3" cstate="print">
             <a:extLst>
               <a:ext uri="{28A0092B-C50C-407E-A947-70E740481C1C}">
-                <a14:useLocalDpi xmlns:a14="http://schemas.microsoft.com/office/drawing/2010/main" xmlns="" val="0"/>
+                <a14:useLocalDpi xmlns="" xmlns:a14="http://schemas.microsoft.com/office/drawing/2010/main" val="0"/>
               </a:ext>
             </a:extLst>
           </a:blip>
@@ -15834,14 +15838,14 @@
           <a:effectLst/>
           <a:extLst>
             <a:ext uri="{909E8E84-426E-40DD-AFC4-6F175D3DCCD1}">
-              <a14:hiddenFill xmlns:a14="http://schemas.microsoft.com/office/drawing/2010/main" xmlns="">
+              <a14:hiddenFill xmlns="" xmlns:a14="http://schemas.microsoft.com/office/drawing/2010/main">
                 <a:solidFill>
                   <a:schemeClr val="accent1"/>
                 </a:solidFill>
               </a14:hiddenFill>
             </a:ext>
             <a:ext uri="{91240B29-F687-4F45-9708-019B960494DF}">
-              <a14:hiddenLine xmlns:a14="http://schemas.microsoft.com/office/drawing/2010/main" xmlns="" w="9525">
+              <a14:hiddenLine xmlns="" xmlns:a14="http://schemas.microsoft.com/office/drawing/2010/main" w="9525">
                 <a:solidFill>
                   <a:schemeClr val="tx1"/>
                 </a:solidFill>
@@ -15851,7 +15855,7 @@
               </a14:hiddenLine>
             </a:ext>
             <a:ext uri="{AF507438-7753-43E0-B8FC-AC1667EBCBE1}">
-              <a14:hiddenEffects xmlns:a14="http://schemas.microsoft.com/office/drawing/2010/main" xmlns="">
+              <a14:hiddenEffects xmlns="" xmlns:a14="http://schemas.microsoft.com/office/drawing/2010/main">
                 <a:effectLst>
                   <a:outerShdw dist="35921" dir="2700000" algn="ctr" rotWithShape="0">
                     <a:schemeClr val="bg2"/>
@@ -15865,7 +15869,7 @@
     </p:spTree>
     <p:extLst>
       <p:ext uri="{BB962C8B-B14F-4D97-AF65-F5344CB8AC3E}">
-        <p14:creationId xmlns:p14="http://schemas.microsoft.com/office/powerpoint/2010/main" xmlns="" val="343431817"/>
+        <p14:creationId xmlns="" xmlns:p14="http://schemas.microsoft.com/office/powerpoint/2010/main" val="343431817"/>
       </p:ext>
     </p:extLst>
   </p:cSld>
@@ -16018,7 +16022,11 @@
           <a:p>
             <a:r>
               <a:rPr lang="en-US" sz="2800" dirty="0" smtClean="0"/>
-              <a:t>http://biodiversitylibrary.org/data</a:t>
+              <a:t>https://</a:t>
+            </a:r>
+            <a:r>
+              <a:rPr lang="en-US" sz="2800" dirty="0" smtClean="0"/>
+              <a:t>biodiversitylibrary.org/data</a:t>
             </a:r>
           </a:p>
           <a:p>
@@ -16040,7 +16048,7 @@
     </p:spTree>
     <p:extLst>
       <p:ext uri="{BB962C8B-B14F-4D97-AF65-F5344CB8AC3E}">
-        <p14:creationId xmlns:p14="http://schemas.microsoft.com/office/powerpoint/2010/main" xmlns="" val="4195191575"/>
+        <p14:creationId xmlns="" xmlns:p14="http://schemas.microsoft.com/office/powerpoint/2010/main" val="4195191575"/>
       </p:ext>
     </p:extLst>
   </p:cSld>

</xml_diff>